<commit_message>
aggiunto costruttore per correlazione semplice in Pot_shape ed esteso sample_03
</commit_message>
<xml_diff>
--- a/content/Sample/Sample_02_Belief_propagation_A/README.pptx
+++ b/content/Sample/Sample_02_Belief_propagation_A/README.pptx
@@ -12,6 +12,8 @@
     <p:sldId id="260" r:id="rId6"/>
     <p:sldId id="261" r:id="rId7"/>
     <p:sldId id="262" r:id="rId8"/>
+    <p:sldId id="263" r:id="rId9"/>
+    <p:sldId id="264" r:id="rId10"/>
   </p:sldIdLst>
   <p:sldSz cx="9144000" cy="6858000" type="screen4x3"/>
   <p:notesSz cx="6858000" cy="9144000"/>
@@ -294,7 +296,7 @@
           <a:p>
             <a:fld id="{BC4DB8D6-4652-4C93-A02F-E71A49F8F853}" type="datetimeFigureOut">
               <a:rPr lang="it-IT" smtClean="0"/>
-              <a:t>22/04/2019</a:t>
+              <a:t>29/05/2019</a:t>
             </a:fld>
             <a:endParaRPr lang="it-IT"/>
           </a:p>
@@ -464,7 +466,7 @@
           <a:p>
             <a:fld id="{BC4DB8D6-4652-4C93-A02F-E71A49F8F853}" type="datetimeFigureOut">
               <a:rPr lang="it-IT" smtClean="0"/>
-              <a:t>22/04/2019</a:t>
+              <a:t>29/05/2019</a:t>
             </a:fld>
             <a:endParaRPr lang="it-IT"/>
           </a:p>
@@ -644,7 +646,7 @@
           <a:p>
             <a:fld id="{BC4DB8D6-4652-4C93-A02F-E71A49F8F853}" type="datetimeFigureOut">
               <a:rPr lang="it-IT" smtClean="0"/>
-              <a:t>22/04/2019</a:t>
+              <a:t>29/05/2019</a:t>
             </a:fld>
             <a:endParaRPr lang="it-IT"/>
           </a:p>
@@ -814,7 +816,7 @@
           <a:p>
             <a:fld id="{BC4DB8D6-4652-4C93-A02F-E71A49F8F853}" type="datetimeFigureOut">
               <a:rPr lang="it-IT" smtClean="0"/>
-              <a:t>22/04/2019</a:t>
+              <a:t>29/05/2019</a:t>
             </a:fld>
             <a:endParaRPr lang="it-IT"/>
           </a:p>
@@ -1060,7 +1062,7 @@
           <a:p>
             <a:fld id="{BC4DB8D6-4652-4C93-A02F-E71A49F8F853}" type="datetimeFigureOut">
               <a:rPr lang="it-IT" smtClean="0"/>
-              <a:t>22/04/2019</a:t>
+              <a:t>29/05/2019</a:t>
             </a:fld>
             <a:endParaRPr lang="it-IT"/>
           </a:p>
@@ -1348,7 +1350,7 @@
           <a:p>
             <a:fld id="{BC4DB8D6-4652-4C93-A02F-E71A49F8F853}" type="datetimeFigureOut">
               <a:rPr lang="it-IT" smtClean="0"/>
-              <a:t>22/04/2019</a:t>
+              <a:t>29/05/2019</a:t>
             </a:fld>
             <a:endParaRPr lang="it-IT"/>
           </a:p>
@@ -1770,7 +1772,7 @@
           <a:p>
             <a:fld id="{BC4DB8D6-4652-4C93-A02F-E71A49F8F853}" type="datetimeFigureOut">
               <a:rPr lang="it-IT" smtClean="0"/>
-              <a:t>22/04/2019</a:t>
+              <a:t>29/05/2019</a:t>
             </a:fld>
             <a:endParaRPr lang="it-IT"/>
           </a:p>
@@ -1888,7 +1890,7 @@
           <a:p>
             <a:fld id="{BC4DB8D6-4652-4C93-A02F-E71A49F8F853}" type="datetimeFigureOut">
               <a:rPr lang="it-IT" smtClean="0"/>
-              <a:t>22/04/2019</a:t>
+              <a:t>29/05/2019</a:t>
             </a:fld>
             <a:endParaRPr lang="it-IT"/>
           </a:p>
@@ -1983,7 +1985,7 @@
           <a:p>
             <a:fld id="{BC4DB8D6-4652-4C93-A02F-E71A49F8F853}" type="datetimeFigureOut">
               <a:rPr lang="it-IT" smtClean="0"/>
-              <a:t>22/04/2019</a:t>
+              <a:t>29/05/2019</a:t>
             </a:fld>
             <a:endParaRPr lang="it-IT"/>
           </a:p>
@@ -2260,7 +2262,7 @@
           <a:p>
             <a:fld id="{BC4DB8D6-4652-4C93-A02F-E71A49F8F853}" type="datetimeFigureOut">
               <a:rPr lang="it-IT" smtClean="0"/>
-              <a:t>22/04/2019</a:t>
+              <a:t>29/05/2019</a:t>
             </a:fld>
             <a:endParaRPr lang="it-IT"/>
           </a:p>
@@ -2513,7 +2515,7 @@
           <a:p>
             <a:fld id="{BC4DB8D6-4652-4C93-A02F-E71A49F8F853}" type="datetimeFigureOut">
               <a:rPr lang="it-IT" smtClean="0"/>
-              <a:t>22/04/2019</a:t>
+              <a:t>29/05/2019</a:t>
             </a:fld>
             <a:endParaRPr lang="it-IT"/>
           </a:p>
@@ -2726,7 +2728,7 @@
           <a:p>
             <a:fld id="{BC4DB8D6-4652-4C93-A02F-E71A49F8F853}" type="datetimeFigureOut">
               <a:rPr lang="it-IT" smtClean="0"/>
-              <a:t>22/04/2019</a:t>
+              <a:t>29/05/2019</a:t>
             </a:fld>
             <a:endParaRPr lang="it-IT"/>
           </a:p>
@@ -19839,8 +19841,8 @@
           </p:sp>
         </mc:Fallback>
       </mc:AlternateContent>
-      <mc:AlternateContent xmlns:mc="http://schemas.openxmlformats.org/markup-compatibility/2006">
-        <mc:Choice xmlns:a14="http://schemas.microsoft.com/office/drawing/2010/main" Requires="a14">
+      <mc:AlternateContent xmlns:mc="http://schemas.openxmlformats.org/markup-compatibility/2006" xmlns:a14="http://schemas.microsoft.com/office/drawing/2010/main">
+        <mc:Choice Requires="a14">
           <p:sp>
             <p:nvSpPr>
               <p:cNvPr id="28" name="CasellaDiTesto 27"/>
@@ -20149,7 +20151,7 @@
             </p:txBody>
           </p:sp>
         </mc:Choice>
-        <mc:Fallback>
+        <mc:Fallback xmlns="">
           <p:sp>
             <p:nvSpPr>
               <p:cNvPr id="28" name="CasellaDiTesto 27"/>
@@ -20291,6 +20293,2259 @@
     <p:extLst>
       <p:ext uri="{BB962C8B-B14F-4D97-AF65-F5344CB8AC3E}">
         <p14:creationId xmlns:p14="http://schemas.microsoft.com/office/powerpoint/2010/main" val="10875221"/>
+      </p:ext>
+    </p:extLst>
+  </p:cSld>
+  <p:clrMapOvr>
+    <a:masterClrMapping/>
+  </p:clrMapOvr>
+</p:sld>
+</file>
+
+<file path=ppt/slides/slide8.xml><?xml version="1.0" encoding="utf-8"?>
+<p:sld xmlns:a="http://schemas.openxmlformats.org/drawingml/2006/main" xmlns:r="http://schemas.openxmlformats.org/officeDocument/2006/relationships" xmlns:p="http://schemas.openxmlformats.org/presentationml/2006/main">
+  <p:cSld>
+    <p:spTree>
+      <p:nvGrpSpPr>
+        <p:cNvPr id="1" name=""/>
+        <p:cNvGrpSpPr/>
+        <p:nvPr/>
+      </p:nvGrpSpPr>
+      <p:grpSpPr>
+        <a:xfrm>
+          <a:off x="0" y="0"/>
+          <a:ext cx="0" cy="0"/>
+          <a:chOff x="0" y="0"/>
+          <a:chExt cx="0" cy="0"/>
+        </a:xfrm>
+      </p:grpSpPr>
+      <p:sp>
+        <p:nvSpPr>
+          <p:cNvPr id="2" name="Titolo 1"/>
+          <p:cNvSpPr>
+            <a:spLocks noGrp="1"/>
+          </p:cNvSpPr>
+          <p:nvPr>
+            <p:ph type="ctrTitle"/>
+          </p:nvPr>
+        </p:nvSpPr>
+        <p:spPr/>
+        <p:txBody>
+          <a:bodyPr/>
+          <a:lstStyle/>
+          <a:p>
+            <a:r>
+              <a:rPr lang="it-IT" dirty="0" smtClean="0"/>
+              <a:t>Part </a:t>
+            </a:r>
+            <a:r>
+              <a:rPr lang="it-IT" dirty="0" smtClean="0"/>
+              <a:t>3</a:t>
+            </a:r>
+            <a:endParaRPr lang="it-IT" dirty="0"/>
+          </a:p>
+        </p:txBody>
+      </p:sp>
+    </p:spTree>
+    <p:extLst>
+      <p:ext uri="{BB962C8B-B14F-4D97-AF65-F5344CB8AC3E}">
+        <p14:creationId xmlns:p14="http://schemas.microsoft.com/office/powerpoint/2010/main" val="4210468608"/>
+      </p:ext>
+    </p:extLst>
+  </p:cSld>
+  <p:clrMapOvr>
+    <a:masterClrMapping/>
+  </p:clrMapOvr>
+</p:sld>
+</file>
+
+<file path=ppt/slides/slide9.xml><?xml version="1.0" encoding="utf-8"?>
+<p:sld xmlns:a="http://schemas.openxmlformats.org/drawingml/2006/main" xmlns:r="http://schemas.openxmlformats.org/officeDocument/2006/relationships" xmlns:p="http://schemas.openxmlformats.org/presentationml/2006/main">
+  <p:cSld>
+    <p:spTree>
+      <p:nvGrpSpPr>
+        <p:cNvPr id="1" name=""/>
+        <p:cNvGrpSpPr/>
+        <p:nvPr/>
+      </p:nvGrpSpPr>
+      <p:grpSpPr>
+        <a:xfrm>
+          <a:off x="0" y="0"/>
+          <a:ext cx="0" cy="0"/>
+          <a:chOff x="0" y="0"/>
+          <a:chExt cx="0" cy="0"/>
+        </a:xfrm>
+      </p:grpSpPr>
+      <p:grpSp>
+        <p:nvGrpSpPr>
+          <p:cNvPr id="16" name="Gruppo 15"/>
+          <p:cNvGrpSpPr/>
+          <p:nvPr/>
+        </p:nvGrpSpPr>
+        <p:grpSpPr>
+          <a:xfrm>
+            <a:off x="611560" y="468903"/>
+            <a:ext cx="1454571" cy="5912425"/>
+            <a:chOff x="669157" y="149513"/>
+            <a:chExt cx="1454571" cy="5912425"/>
+          </a:xfrm>
+        </p:grpSpPr>
+        <p:sp>
+          <p:nvSpPr>
+            <p:cNvPr id="4" name="Ovale 3"/>
+            <p:cNvSpPr/>
+            <p:nvPr/>
+          </p:nvSpPr>
+          <p:spPr>
+            <a:xfrm>
+              <a:off x="755576" y="149513"/>
+              <a:ext cx="720080" cy="684076"/>
+            </a:xfrm>
+            <a:prstGeom prst="ellipse">
+              <a:avLst/>
+            </a:prstGeom>
+          </p:spPr>
+          <p:style>
+            <a:lnRef idx="2">
+              <a:schemeClr val="dk1"/>
+            </a:lnRef>
+            <a:fillRef idx="1">
+              <a:schemeClr val="lt1"/>
+            </a:fillRef>
+            <a:effectRef idx="0">
+              <a:schemeClr val="dk1"/>
+            </a:effectRef>
+            <a:fontRef idx="minor">
+              <a:schemeClr val="dk1"/>
+            </a:fontRef>
+          </p:style>
+          <p:txBody>
+            <a:bodyPr rtlCol="0" anchor="ctr"/>
+            <a:lstStyle/>
+            <a:p>
+              <a:pPr algn="ctr"/>
+              <a:r>
+                <a:rPr lang="it-IT" sz="2400" dirty="0" smtClean="0"/>
+                <a:t>Y0</a:t>
+              </a:r>
+              <a:endParaRPr lang="it-IT" sz="2400" dirty="0"/>
+            </a:p>
+          </p:txBody>
+        </p:sp>
+        <p:grpSp>
+          <p:nvGrpSpPr>
+            <p:cNvPr id="10" name="Gruppo 9"/>
+            <p:cNvGrpSpPr/>
+            <p:nvPr/>
+          </p:nvGrpSpPr>
+          <p:grpSpPr>
+            <a:xfrm>
+              <a:off x="683568" y="833589"/>
+              <a:ext cx="1440160" cy="1192778"/>
+              <a:chOff x="683568" y="833589"/>
+              <a:chExt cx="1440160" cy="1192778"/>
+            </a:xfrm>
+          </p:grpSpPr>
+          <p:sp>
+            <p:nvSpPr>
+              <p:cNvPr id="5" name="Ovale 4"/>
+              <p:cNvSpPr/>
+              <p:nvPr/>
+            </p:nvSpPr>
+            <p:spPr>
+              <a:xfrm>
+                <a:off x="755576" y="1342291"/>
+                <a:ext cx="720080" cy="684076"/>
+              </a:xfrm>
+              <a:prstGeom prst="ellipse">
+                <a:avLst/>
+              </a:prstGeom>
+            </p:spPr>
+            <p:style>
+              <a:lnRef idx="2">
+                <a:schemeClr val="dk1"/>
+              </a:lnRef>
+              <a:fillRef idx="1">
+                <a:schemeClr val="lt1"/>
+              </a:fillRef>
+              <a:effectRef idx="0">
+                <a:schemeClr val="dk1"/>
+              </a:effectRef>
+              <a:fontRef idx="minor">
+                <a:schemeClr val="dk1"/>
+              </a:fontRef>
+            </p:style>
+            <p:txBody>
+              <a:bodyPr rtlCol="0" anchor="ctr"/>
+              <a:lstStyle/>
+              <a:p>
+                <a:pPr algn="ctr"/>
+                <a:r>
+                  <a:rPr lang="it-IT" sz="2400" dirty="0"/>
+                  <a:t>Y1</a:t>
+                </a:r>
+                <a:endParaRPr lang="it-IT" sz="2400" dirty="0"/>
+              </a:p>
+            </p:txBody>
+          </p:sp>
+          <p:grpSp>
+            <p:nvGrpSpPr>
+              <p:cNvPr id="12" name="Gruppo 11"/>
+              <p:cNvGrpSpPr/>
+              <p:nvPr/>
+            </p:nvGrpSpPr>
+            <p:grpSpPr>
+              <a:xfrm>
+                <a:off x="683568" y="833589"/>
+                <a:ext cx="1440160" cy="508702"/>
+                <a:chOff x="323528" y="872716"/>
+                <a:chExt cx="1440160" cy="508702"/>
+              </a:xfrm>
+            </p:grpSpPr>
+            <p:grpSp>
+              <p:nvGrpSpPr>
+                <p:cNvPr id="9" name="Gruppo 8"/>
+                <p:cNvGrpSpPr/>
+                <p:nvPr/>
+              </p:nvGrpSpPr>
+              <p:grpSpPr>
+                <a:xfrm>
+                  <a:off x="683568" y="872716"/>
+                  <a:ext cx="144016" cy="508702"/>
+                  <a:chOff x="683568" y="872716"/>
+                  <a:chExt cx="144016" cy="508702"/>
+                </a:xfrm>
+              </p:grpSpPr>
+              <p:cxnSp>
+                <p:nvCxnSpPr>
+                  <p:cNvPr id="7" name="Connettore 1 6"/>
+                  <p:cNvCxnSpPr>
+                    <a:stCxn id="4" idx="4"/>
+                    <a:endCxn id="5" idx="0"/>
+                  </p:cNvCxnSpPr>
+                  <p:nvPr/>
+                </p:nvCxnSpPr>
+                <p:spPr>
+                  <a:xfrm>
+                    <a:off x="755576" y="872716"/>
+                    <a:ext cx="0" cy="508702"/>
+                  </a:xfrm>
+                  <a:prstGeom prst="line">
+                    <a:avLst/>
+                  </a:prstGeom>
+                </p:spPr>
+                <p:style>
+                  <a:lnRef idx="1">
+                    <a:schemeClr val="dk1"/>
+                  </a:lnRef>
+                  <a:fillRef idx="0">
+                    <a:schemeClr val="dk1"/>
+                  </a:fillRef>
+                  <a:effectRef idx="0">
+                    <a:schemeClr val="dk1"/>
+                  </a:effectRef>
+                  <a:fontRef idx="minor">
+                    <a:schemeClr val="tx1"/>
+                  </a:fontRef>
+                </p:style>
+              </p:cxnSp>
+              <p:sp>
+                <p:nvSpPr>
+                  <p:cNvPr id="8" name="Rettangolo 7"/>
+                  <p:cNvSpPr/>
+                  <p:nvPr/>
+                </p:nvSpPr>
+                <p:spPr>
+                  <a:xfrm>
+                    <a:off x="683568" y="1019855"/>
+                    <a:ext cx="144016" cy="144016"/>
+                  </a:xfrm>
+                  <a:prstGeom prst="rect">
+                    <a:avLst/>
+                  </a:prstGeom>
+                </p:spPr>
+                <p:style>
+                  <a:lnRef idx="2">
+                    <a:schemeClr val="dk1">
+                      <a:shade val="50000"/>
+                    </a:schemeClr>
+                  </a:lnRef>
+                  <a:fillRef idx="1">
+                    <a:schemeClr val="dk1"/>
+                  </a:fillRef>
+                  <a:effectRef idx="0">
+                    <a:schemeClr val="dk1"/>
+                  </a:effectRef>
+                  <a:fontRef idx="minor">
+                    <a:schemeClr val="lt1"/>
+                  </a:fontRef>
+                </p:style>
+                <p:txBody>
+                  <a:bodyPr rtlCol="0" anchor="ctr"/>
+                  <a:lstStyle/>
+                  <a:p>
+                    <a:pPr algn="ctr"/>
+                    <a:endParaRPr lang="it-IT"/>
+                  </a:p>
+                </p:txBody>
+              </p:sp>
+            </p:grpSp>
+            <mc:AlternateContent xmlns:mc="http://schemas.openxmlformats.org/markup-compatibility/2006">
+              <mc:Choice xmlns:a14="http://schemas.microsoft.com/office/drawing/2010/main" Requires="a14">
+                <p:sp>
+                  <p:nvSpPr>
+                    <p:cNvPr id="11" name="CasellaDiTesto 10"/>
+                    <p:cNvSpPr txBox="1"/>
+                    <p:nvPr/>
+                  </p:nvSpPr>
+                  <p:spPr>
+                    <a:xfrm>
+                      <a:off x="323528" y="907197"/>
+                      <a:ext cx="1440160" cy="369332"/>
+                    </a:xfrm>
+                    <a:prstGeom prst="rect">
+                      <a:avLst/>
+                    </a:prstGeom>
+                    <a:noFill/>
+                  </p:spPr>
+                  <p:txBody>
+                    <a:bodyPr wrap="square" rtlCol="0">
+                      <a:spAutoFit/>
+                    </a:bodyPr>
+                    <a:lstStyle/>
+                    <a:p>
+                      <a:pPr/>
+                      <a14:m>
+                        <m:oMathPara xmlns:m="http://schemas.openxmlformats.org/officeDocument/2006/math">
+                          <m:oMathParaPr>
+                            <m:jc m:val="centerGroup"/>
+                          </m:oMathParaPr>
+                          <m:oMath xmlns:m="http://schemas.openxmlformats.org/officeDocument/2006/math">
+                            <m:sSub>
+                              <m:sSubPr>
+                                <m:ctrlPr>
+                                  <a:rPr lang="it-IT" i="1" smtClean="0">
+                                    <a:latin typeface="Cambria Math"/>
+                                  </a:rPr>
+                                </m:ctrlPr>
+                              </m:sSubPr>
+                              <m:e>
+                                <m:r>
+                                  <a:rPr lang="az-Cyrl-AZ" i="1" smtClean="0">
+                                    <a:latin typeface="Cambria Math"/>
+                                  </a:rPr>
+                                  <m:t>ѱ</m:t>
+                                </m:r>
+                              </m:e>
+                              <m:sub>
+                                <m:r>
+                                  <a:rPr lang="it-IT" b="0" i="1" smtClean="0">
+                                    <a:latin typeface="Cambria Math"/>
+                                  </a:rPr>
+                                  <m:t>1</m:t>
+                                </m:r>
+                              </m:sub>
+                            </m:sSub>
+                          </m:oMath>
+                        </m:oMathPara>
+                      </a14:m>
+                      <a:endParaRPr lang="it-IT" dirty="0"/>
+                    </a:p>
+                  </p:txBody>
+                </p:sp>
+              </mc:Choice>
+              <mc:Fallback>
+                <p:sp>
+                  <p:nvSpPr>
+                    <p:cNvPr id="11" name="CasellaDiTesto 10"/>
+                    <p:cNvSpPr txBox="1">
+                      <a:spLocks noRot="1" noChangeAspect="1" noMove="1" noResize="1" noEditPoints="1" noAdjustHandles="1" noChangeArrowheads="1" noChangeShapeType="1" noTextEdit="1"/>
+                    </p:cNvSpPr>
+                    <p:nvPr/>
+                  </p:nvSpPr>
+                  <p:spPr>
+                    <a:xfrm>
+                      <a:off x="323528" y="907197"/>
+                      <a:ext cx="1440160" cy="369332"/>
+                    </a:xfrm>
+                    <a:prstGeom prst="rect">
+                      <a:avLst/>
+                    </a:prstGeom>
+                    <a:blipFill rotWithShape="1">
+                      <a:blip r:embed="rId2"/>
+                      <a:stretch>
+                        <a:fillRect b="-13333"/>
+                      </a:stretch>
+                    </a:blipFill>
+                  </p:spPr>
+                  <p:txBody>
+                    <a:bodyPr/>
+                    <a:lstStyle/>
+                    <a:p>
+                      <a:r>
+                        <a:rPr lang="it-IT">
+                          <a:noFill/>
+                        </a:rPr>
+                        <a:t> </a:t>
+                      </a:r>
+                    </a:p>
+                  </p:txBody>
+                </p:sp>
+              </mc:Fallback>
+            </mc:AlternateContent>
+          </p:grpSp>
+        </p:grpSp>
+        <p:grpSp>
+          <p:nvGrpSpPr>
+            <p:cNvPr id="35" name="Gruppo 34"/>
+            <p:cNvGrpSpPr/>
+            <p:nvPr/>
+          </p:nvGrpSpPr>
+          <p:grpSpPr>
+            <a:xfrm>
+              <a:off x="669157" y="2040563"/>
+              <a:ext cx="1440160" cy="1192778"/>
+              <a:chOff x="683568" y="833589"/>
+              <a:chExt cx="1440160" cy="1192778"/>
+            </a:xfrm>
+          </p:grpSpPr>
+          <p:sp>
+            <p:nvSpPr>
+              <p:cNvPr id="42" name="Ovale 41"/>
+              <p:cNvSpPr/>
+              <p:nvPr/>
+            </p:nvSpPr>
+            <p:spPr>
+              <a:xfrm>
+                <a:off x="755576" y="1342291"/>
+                <a:ext cx="720080" cy="684076"/>
+              </a:xfrm>
+              <a:prstGeom prst="ellipse">
+                <a:avLst/>
+              </a:prstGeom>
+            </p:spPr>
+            <p:style>
+              <a:lnRef idx="2">
+                <a:schemeClr val="dk1"/>
+              </a:lnRef>
+              <a:fillRef idx="1">
+                <a:schemeClr val="lt1"/>
+              </a:fillRef>
+              <a:effectRef idx="0">
+                <a:schemeClr val="dk1"/>
+              </a:effectRef>
+              <a:fontRef idx="minor">
+                <a:schemeClr val="dk1"/>
+              </a:fontRef>
+            </p:style>
+            <p:txBody>
+              <a:bodyPr rtlCol="0" anchor="ctr"/>
+              <a:lstStyle/>
+              <a:p>
+                <a:pPr algn="ctr"/>
+                <a:r>
+                  <a:rPr lang="it-IT" sz="2400" dirty="0" smtClean="0"/>
+                  <a:t>Y2</a:t>
+                </a:r>
+                <a:endParaRPr lang="it-IT" sz="2400" dirty="0"/>
+              </a:p>
+            </p:txBody>
+          </p:sp>
+          <p:grpSp>
+            <p:nvGrpSpPr>
+              <p:cNvPr id="45" name="Gruppo 44"/>
+              <p:cNvGrpSpPr/>
+              <p:nvPr/>
+            </p:nvGrpSpPr>
+            <p:grpSpPr>
+              <a:xfrm>
+                <a:off x="683568" y="833589"/>
+                <a:ext cx="1440160" cy="508702"/>
+                <a:chOff x="323528" y="872716"/>
+                <a:chExt cx="1440160" cy="508702"/>
+              </a:xfrm>
+            </p:grpSpPr>
+            <p:grpSp>
+              <p:nvGrpSpPr>
+                <p:cNvPr id="46" name="Gruppo 45"/>
+                <p:cNvGrpSpPr/>
+                <p:nvPr/>
+              </p:nvGrpSpPr>
+              <p:grpSpPr>
+                <a:xfrm>
+                  <a:off x="683568" y="872716"/>
+                  <a:ext cx="144016" cy="508702"/>
+                  <a:chOff x="683568" y="872716"/>
+                  <a:chExt cx="144016" cy="508702"/>
+                </a:xfrm>
+              </p:grpSpPr>
+              <p:cxnSp>
+                <p:nvCxnSpPr>
+                  <p:cNvPr id="48" name="Connettore 1 47"/>
+                  <p:cNvCxnSpPr>
+                    <a:endCxn id="42" idx="0"/>
+                  </p:cNvCxnSpPr>
+                  <p:nvPr/>
+                </p:nvCxnSpPr>
+                <p:spPr>
+                  <a:xfrm>
+                    <a:off x="755576" y="872716"/>
+                    <a:ext cx="0" cy="508702"/>
+                  </a:xfrm>
+                  <a:prstGeom prst="line">
+                    <a:avLst/>
+                  </a:prstGeom>
+                </p:spPr>
+                <p:style>
+                  <a:lnRef idx="1">
+                    <a:schemeClr val="dk1"/>
+                  </a:lnRef>
+                  <a:fillRef idx="0">
+                    <a:schemeClr val="dk1"/>
+                  </a:fillRef>
+                  <a:effectRef idx="0">
+                    <a:schemeClr val="dk1"/>
+                  </a:effectRef>
+                  <a:fontRef idx="minor">
+                    <a:schemeClr val="tx1"/>
+                  </a:fontRef>
+                </p:style>
+              </p:cxnSp>
+              <p:sp>
+                <p:nvSpPr>
+                  <p:cNvPr id="49" name="Rettangolo 48"/>
+                  <p:cNvSpPr/>
+                  <p:nvPr/>
+                </p:nvSpPr>
+                <p:spPr>
+                  <a:xfrm>
+                    <a:off x="683568" y="1019855"/>
+                    <a:ext cx="144016" cy="144016"/>
+                  </a:xfrm>
+                  <a:prstGeom prst="rect">
+                    <a:avLst/>
+                  </a:prstGeom>
+                </p:spPr>
+                <p:style>
+                  <a:lnRef idx="2">
+                    <a:schemeClr val="dk1">
+                      <a:shade val="50000"/>
+                    </a:schemeClr>
+                  </a:lnRef>
+                  <a:fillRef idx="1">
+                    <a:schemeClr val="dk1"/>
+                  </a:fillRef>
+                  <a:effectRef idx="0">
+                    <a:schemeClr val="dk1"/>
+                  </a:effectRef>
+                  <a:fontRef idx="minor">
+                    <a:schemeClr val="lt1"/>
+                  </a:fontRef>
+                </p:style>
+                <p:txBody>
+                  <a:bodyPr rtlCol="0" anchor="ctr"/>
+                  <a:lstStyle/>
+                  <a:p>
+                    <a:pPr algn="ctr"/>
+                    <a:endParaRPr lang="it-IT"/>
+                  </a:p>
+                </p:txBody>
+              </p:sp>
+            </p:grpSp>
+            <mc:AlternateContent xmlns:mc="http://schemas.openxmlformats.org/markup-compatibility/2006">
+              <mc:Choice xmlns:a14="http://schemas.microsoft.com/office/drawing/2010/main" Requires="a14">
+                <p:sp>
+                  <p:nvSpPr>
+                    <p:cNvPr id="47" name="CasellaDiTesto 46"/>
+                    <p:cNvSpPr txBox="1"/>
+                    <p:nvPr/>
+                  </p:nvSpPr>
+                  <p:spPr>
+                    <a:xfrm>
+                      <a:off x="323528" y="907197"/>
+                      <a:ext cx="1440160" cy="369332"/>
+                    </a:xfrm>
+                    <a:prstGeom prst="rect">
+                      <a:avLst/>
+                    </a:prstGeom>
+                    <a:noFill/>
+                  </p:spPr>
+                  <p:txBody>
+                    <a:bodyPr wrap="square" rtlCol="0">
+                      <a:spAutoFit/>
+                    </a:bodyPr>
+                    <a:lstStyle/>
+                    <a:p>
+                      <a:pPr/>
+                      <a14:m>
+                        <m:oMathPara xmlns:m="http://schemas.openxmlformats.org/officeDocument/2006/math">
+                          <m:oMathParaPr>
+                            <m:jc m:val="centerGroup"/>
+                          </m:oMathParaPr>
+                          <m:oMath xmlns:m="http://schemas.openxmlformats.org/officeDocument/2006/math">
+                            <m:sSub>
+                              <m:sSubPr>
+                                <m:ctrlPr>
+                                  <a:rPr lang="it-IT" i="1" smtClean="0">
+                                    <a:latin typeface="Cambria Math"/>
+                                  </a:rPr>
+                                </m:ctrlPr>
+                              </m:sSubPr>
+                              <m:e>
+                                <m:r>
+                                  <a:rPr lang="az-Cyrl-AZ" i="1">
+                                    <a:latin typeface="Cambria Math"/>
+                                  </a:rPr>
+                                  <m:t>ѱ</m:t>
+                                </m:r>
+                              </m:e>
+                              <m:sub>
+                                <m:r>
+                                  <a:rPr lang="it-IT" b="0" i="1" smtClean="0">
+                                    <a:latin typeface="Cambria Math"/>
+                                  </a:rPr>
+                                  <m:t>2</m:t>
+                                </m:r>
+                              </m:sub>
+                            </m:sSub>
+                          </m:oMath>
+                        </m:oMathPara>
+                      </a14:m>
+                      <a:endParaRPr lang="it-IT" dirty="0"/>
+                    </a:p>
+                  </p:txBody>
+                </p:sp>
+              </mc:Choice>
+              <mc:Fallback>
+                <p:sp>
+                  <p:nvSpPr>
+                    <p:cNvPr id="47" name="CasellaDiTesto 46"/>
+                    <p:cNvSpPr txBox="1">
+                      <a:spLocks noRot="1" noChangeAspect="1" noMove="1" noResize="1" noEditPoints="1" noAdjustHandles="1" noChangeArrowheads="1" noChangeShapeType="1" noTextEdit="1"/>
+                    </p:cNvSpPr>
+                    <p:nvPr/>
+                  </p:nvSpPr>
+                  <p:spPr>
+                    <a:xfrm>
+                      <a:off x="323528" y="907197"/>
+                      <a:ext cx="1440160" cy="369332"/>
+                    </a:xfrm>
+                    <a:prstGeom prst="rect">
+                      <a:avLst/>
+                    </a:prstGeom>
+                    <a:blipFill rotWithShape="1">
+                      <a:blip r:embed="rId3"/>
+                      <a:stretch>
+                        <a:fillRect b="-13333"/>
+                      </a:stretch>
+                    </a:blipFill>
+                  </p:spPr>
+                  <p:txBody>
+                    <a:bodyPr/>
+                    <a:lstStyle/>
+                    <a:p>
+                      <a:r>
+                        <a:rPr lang="it-IT">
+                          <a:noFill/>
+                        </a:rPr>
+                        <a:t> </a:t>
+                      </a:r>
+                    </a:p>
+                  </p:txBody>
+                </p:sp>
+              </mc:Fallback>
+            </mc:AlternateContent>
+          </p:grpSp>
+        </p:grpSp>
+        <p:grpSp>
+          <p:nvGrpSpPr>
+            <p:cNvPr id="50" name="Gruppo 49"/>
+            <p:cNvGrpSpPr/>
+            <p:nvPr/>
+          </p:nvGrpSpPr>
+          <p:grpSpPr>
+            <a:xfrm>
+              <a:off x="669157" y="4869160"/>
+              <a:ext cx="1440160" cy="1192778"/>
+              <a:chOff x="683568" y="833589"/>
+              <a:chExt cx="1440160" cy="1192778"/>
+            </a:xfrm>
+          </p:grpSpPr>
+          <p:sp>
+            <p:nvSpPr>
+              <p:cNvPr id="51" name="Ovale 50"/>
+              <p:cNvSpPr/>
+              <p:nvPr/>
+            </p:nvSpPr>
+            <p:spPr>
+              <a:xfrm>
+                <a:off x="755576" y="1342291"/>
+                <a:ext cx="720080" cy="684076"/>
+              </a:xfrm>
+              <a:prstGeom prst="ellipse">
+                <a:avLst/>
+              </a:prstGeom>
+            </p:spPr>
+            <p:style>
+              <a:lnRef idx="2">
+                <a:schemeClr val="dk1"/>
+              </a:lnRef>
+              <a:fillRef idx="1">
+                <a:schemeClr val="lt1"/>
+              </a:fillRef>
+              <a:effectRef idx="0">
+                <a:schemeClr val="dk1"/>
+              </a:effectRef>
+              <a:fontRef idx="minor">
+                <a:schemeClr val="dk1"/>
+              </a:fontRef>
+            </p:style>
+            <p:txBody>
+              <a:bodyPr rtlCol="0" anchor="ctr"/>
+              <a:lstStyle/>
+              <a:p>
+                <a:pPr algn="ctr"/>
+                <a:r>
+                  <a:rPr lang="it-IT" sz="2400" dirty="0" err="1" smtClean="0"/>
+                  <a:t>Yn</a:t>
+                </a:r>
+                <a:endParaRPr lang="it-IT" sz="2400" dirty="0"/>
+              </a:p>
+            </p:txBody>
+          </p:sp>
+          <p:grpSp>
+            <p:nvGrpSpPr>
+              <p:cNvPr id="52" name="Gruppo 51"/>
+              <p:cNvGrpSpPr/>
+              <p:nvPr/>
+            </p:nvGrpSpPr>
+            <p:grpSpPr>
+              <a:xfrm>
+                <a:off x="683568" y="833589"/>
+                <a:ext cx="1440160" cy="508702"/>
+                <a:chOff x="323528" y="872716"/>
+                <a:chExt cx="1440160" cy="508702"/>
+              </a:xfrm>
+            </p:grpSpPr>
+            <p:grpSp>
+              <p:nvGrpSpPr>
+                <p:cNvPr id="53" name="Gruppo 52"/>
+                <p:cNvGrpSpPr/>
+                <p:nvPr/>
+              </p:nvGrpSpPr>
+              <p:grpSpPr>
+                <a:xfrm>
+                  <a:off x="683568" y="872716"/>
+                  <a:ext cx="144016" cy="508702"/>
+                  <a:chOff x="683568" y="872716"/>
+                  <a:chExt cx="144016" cy="508702"/>
+                </a:xfrm>
+              </p:grpSpPr>
+              <p:cxnSp>
+                <p:nvCxnSpPr>
+                  <p:cNvPr id="55" name="Connettore 1 54"/>
+                  <p:cNvCxnSpPr>
+                    <a:endCxn id="51" idx="0"/>
+                  </p:cNvCxnSpPr>
+                  <p:nvPr/>
+                </p:nvCxnSpPr>
+                <p:spPr>
+                  <a:xfrm>
+                    <a:off x="755576" y="872716"/>
+                    <a:ext cx="0" cy="508702"/>
+                  </a:xfrm>
+                  <a:prstGeom prst="line">
+                    <a:avLst/>
+                  </a:prstGeom>
+                </p:spPr>
+                <p:style>
+                  <a:lnRef idx="1">
+                    <a:schemeClr val="dk1"/>
+                  </a:lnRef>
+                  <a:fillRef idx="0">
+                    <a:schemeClr val="dk1"/>
+                  </a:fillRef>
+                  <a:effectRef idx="0">
+                    <a:schemeClr val="dk1"/>
+                  </a:effectRef>
+                  <a:fontRef idx="minor">
+                    <a:schemeClr val="tx1"/>
+                  </a:fontRef>
+                </p:style>
+              </p:cxnSp>
+              <p:sp>
+                <p:nvSpPr>
+                  <p:cNvPr id="56" name="Rettangolo 55"/>
+                  <p:cNvSpPr/>
+                  <p:nvPr/>
+                </p:nvSpPr>
+                <p:spPr>
+                  <a:xfrm>
+                    <a:off x="683568" y="1019855"/>
+                    <a:ext cx="144016" cy="144016"/>
+                  </a:xfrm>
+                  <a:prstGeom prst="rect">
+                    <a:avLst/>
+                  </a:prstGeom>
+                </p:spPr>
+                <p:style>
+                  <a:lnRef idx="2">
+                    <a:schemeClr val="dk1">
+                      <a:shade val="50000"/>
+                    </a:schemeClr>
+                  </a:lnRef>
+                  <a:fillRef idx="1">
+                    <a:schemeClr val="dk1"/>
+                  </a:fillRef>
+                  <a:effectRef idx="0">
+                    <a:schemeClr val="dk1"/>
+                  </a:effectRef>
+                  <a:fontRef idx="minor">
+                    <a:schemeClr val="lt1"/>
+                  </a:fontRef>
+                </p:style>
+                <p:txBody>
+                  <a:bodyPr rtlCol="0" anchor="ctr"/>
+                  <a:lstStyle/>
+                  <a:p>
+                    <a:pPr algn="ctr"/>
+                    <a:endParaRPr lang="it-IT"/>
+                  </a:p>
+                </p:txBody>
+              </p:sp>
+            </p:grpSp>
+            <mc:AlternateContent xmlns:mc="http://schemas.openxmlformats.org/markup-compatibility/2006">
+              <mc:Choice xmlns:a14="http://schemas.microsoft.com/office/drawing/2010/main" Requires="a14">
+                <p:sp>
+                  <p:nvSpPr>
+                    <p:cNvPr id="54" name="CasellaDiTesto 53"/>
+                    <p:cNvSpPr txBox="1"/>
+                    <p:nvPr/>
+                  </p:nvSpPr>
+                  <p:spPr>
+                    <a:xfrm>
+                      <a:off x="323528" y="907197"/>
+                      <a:ext cx="1440160" cy="369332"/>
+                    </a:xfrm>
+                    <a:prstGeom prst="rect">
+                      <a:avLst/>
+                    </a:prstGeom>
+                    <a:noFill/>
+                  </p:spPr>
+                  <p:txBody>
+                    <a:bodyPr wrap="square" rtlCol="0">
+                      <a:spAutoFit/>
+                    </a:bodyPr>
+                    <a:lstStyle/>
+                    <a:p>
+                      <a:pPr/>
+                      <a14:m>
+                        <m:oMathPara xmlns:m="http://schemas.openxmlformats.org/officeDocument/2006/math">
+                          <m:oMathParaPr>
+                            <m:jc m:val="centerGroup"/>
+                          </m:oMathParaPr>
+                          <m:oMath xmlns:m="http://schemas.openxmlformats.org/officeDocument/2006/math">
+                            <m:sSub>
+                              <m:sSubPr>
+                                <m:ctrlPr>
+                                  <a:rPr lang="it-IT" i="1" smtClean="0">
+                                    <a:latin typeface="Cambria Math"/>
+                                  </a:rPr>
+                                </m:ctrlPr>
+                              </m:sSubPr>
+                              <m:e>
+                                <m:r>
+                                  <a:rPr lang="az-Cyrl-AZ" i="1" smtClean="0">
+                                    <a:latin typeface="Cambria Math"/>
+                                  </a:rPr>
+                                  <m:t>ѱ</m:t>
+                                </m:r>
+                              </m:e>
+                              <m:sub>
+                                <m:r>
+                                  <a:rPr lang="it-IT" b="0" i="1" smtClean="0">
+                                    <a:latin typeface="Cambria Math"/>
+                                  </a:rPr>
+                                  <m:t>𝑛</m:t>
+                                </m:r>
+                              </m:sub>
+                            </m:sSub>
+                          </m:oMath>
+                        </m:oMathPara>
+                      </a14:m>
+                      <a:endParaRPr lang="it-IT" dirty="0"/>
+                    </a:p>
+                  </p:txBody>
+                </p:sp>
+              </mc:Choice>
+              <mc:Fallback>
+                <p:sp>
+                  <p:nvSpPr>
+                    <p:cNvPr id="54" name="CasellaDiTesto 53"/>
+                    <p:cNvSpPr txBox="1">
+                      <a:spLocks noRot="1" noChangeAspect="1" noMove="1" noResize="1" noEditPoints="1" noAdjustHandles="1" noChangeArrowheads="1" noChangeShapeType="1" noTextEdit="1"/>
+                    </p:cNvSpPr>
+                    <p:nvPr/>
+                  </p:nvSpPr>
+                  <p:spPr>
+                    <a:xfrm>
+                      <a:off x="323528" y="907197"/>
+                      <a:ext cx="1440160" cy="369332"/>
+                    </a:xfrm>
+                    <a:prstGeom prst="rect">
+                      <a:avLst/>
+                    </a:prstGeom>
+                    <a:blipFill rotWithShape="1">
+                      <a:blip r:embed="rId4"/>
+                      <a:stretch>
+                        <a:fillRect b="-13333"/>
+                      </a:stretch>
+                    </a:blipFill>
+                  </p:spPr>
+                  <p:txBody>
+                    <a:bodyPr/>
+                    <a:lstStyle/>
+                    <a:p>
+                      <a:r>
+                        <a:rPr lang="it-IT">
+                          <a:noFill/>
+                        </a:rPr>
+                        <a:t> </a:t>
+                      </a:r>
+                    </a:p>
+                  </p:txBody>
+                </p:sp>
+              </mc:Fallback>
+            </mc:AlternateContent>
+          </p:grpSp>
+        </p:grpSp>
+        <p:cxnSp>
+          <p:nvCxnSpPr>
+            <p:cNvPr id="14" name="Connettore 1 13"/>
+            <p:cNvCxnSpPr/>
+            <p:nvPr/>
+          </p:nvCxnSpPr>
+          <p:spPr>
+            <a:xfrm>
+              <a:off x="1101205" y="3356992"/>
+              <a:ext cx="0" cy="1296144"/>
+            </a:xfrm>
+            <a:prstGeom prst="line">
+              <a:avLst/>
+            </a:prstGeom>
+            <a:ln>
+              <a:prstDash val="dash"/>
+            </a:ln>
+          </p:spPr>
+          <p:style>
+            <a:lnRef idx="1">
+              <a:schemeClr val="dk1"/>
+            </a:lnRef>
+            <a:fillRef idx="0">
+              <a:schemeClr val="dk1"/>
+            </a:fillRef>
+            <a:effectRef idx="0">
+              <a:schemeClr val="dk1"/>
+            </a:effectRef>
+            <a:fontRef idx="minor">
+              <a:schemeClr val="tx1"/>
+            </a:fontRef>
+          </p:style>
+        </p:cxnSp>
+      </p:grpSp>
+      <p:sp>
+        <p:nvSpPr>
+          <p:cNvPr id="17" name="Ovale 16"/>
+          <p:cNvSpPr/>
+          <p:nvPr/>
+        </p:nvSpPr>
+        <p:spPr>
+          <a:xfrm>
+            <a:off x="503548" y="260121"/>
+            <a:ext cx="1080120" cy="938427"/>
+          </a:xfrm>
+          <a:prstGeom prst="ellipse">
+            <a:avLst/>
+          </a:prstGeom>
+          <a:solidFill>
+            <a:schemeClr val="lt1">
+              <a:alpha val="0"/>
+            </a:schemeClr>
+          </a:solidFill>
+          <a:ln w="9525">
+            <a:prstDash val="dash"/>
+          </a:ln>
+        </p:spPr>
+        <p:style>
+          <a:lnRef idx="2">
+            <a:schemeClr val="dk1"/>
+          </a:lnRef>
+          <a:fillRef idx="1">
+            <a:schemeClr val="lt1"/>
+          </a:fillRef>
+          <a:effectRef idx="0">
+            <a:schemeClr val="dk1"/>
+          </a:effectRef>
+          <a:fontRef idx="minor">
+            <a:schemeClr val="dk1"/>
+          </a:fontRef>
+        </p:style>
+        <p:txBody>
+          <a:bodyPr rtlCol="0" anchor="ctr"/>
+          <a:lstStyle/>
+          <a:p>
+            <a:pPr algn="ctr"/>
+            <a:endParaRPr lang="it-IT"/>
+          </a:p>
+        </p:txBody>
+      </p:sp>
+      <p:sp>
+        <p:nvSpPr>
+          <p:cNvPr id="57" name="Freccia a destra 56"/>
+          <p:cNvSpPr/>
+          <p:nvPr/>
+        </p:nvSpPr>
+        <p:spPr>
+          <a:xfrm>
+            <a:off x="1812210" y="924014"/>
+            <a:ext cx="1728192" cy="432048"/>
+          </a:xfrm>
+          <a:prstGeom prst="rightArrow">
+            <a:avLst/>
+          </a:prstGeom>
+        </p:spPr>
+        <p:style>
+          <a:lnRef idx="2">
+            <a:schemeClr val="accent1">
+              <a:shade val="50000"/>
+            </a:schemeClr>
+          </a:lnRef>
+          <a:fillRef idx="1">
+            <a:schemeClr val="accent1"/>
+          </a:fillRef>
+          <a:effectRef idx="0">
+            <a:schemeClr val="accent1"/>
+          </a:effectRef>
+          <a:fontRef idx="minor">
+            <a:schemeClr val="lt1"/>
+          </a:fontRef>
+        </p:style>
+        <p:txBody>
+          <a:bodyPr rtlCol="0" anchor="ctr"/>
+          <a:lstStyle/>
+          <a:p>
+            <a:pPr algn="ctr"/>
+            <a:endParaRPr lang="it-IT"/>
+          </a:p>
+        </p:txBody>
+      </p:sp>
+      <p:sp>
+        <p:nvSpPr>
+          <p:cNvPr id="58" name="CasellaDiTesto 57"/>
+          <p:cNvSpPr txBox="1"/>
+          <p:nvPr/>
+        </p:nvSpPr>
+        <p:spPr>
+          <a:xfrm>
+            <a:off x="1763688" y="332656"/>
+            <a:ext cx="2860848" cy="646331"/>
+          </a:xfrm>
+          <a:prstGeom prst="rect">
+            <a:avLst/>
+          </a:prstGeom>
+          <a:noFill/>
+        </p:spPr>
+        <p:txBody>
+          <a:bodyPr wrap="none" rtlCol="0">
+            <a:spAutoFit/>
+          </a:bodyPr>
+          <a:lstStyle/>
+          <a:p>
+            <a:r>
+              <a:rPr lang="it-IT" dirty="0" smtClean="0"/>
+              <a:t>Y0</a:t>
+            </a:r>
+            <a:r>
+              <a:rPr lang="it-IT" dirty="0" smtClean="0"/>
+              <a:t> </a:t>
+            </a:r>
+            <a:r>
+              <a:rPr lang="it-IT" dirty="0" err="1" smtClean="0"/>
+              <a:t>is</a:t>
+            </a:r>
+            <a:r>
+              <a:rPr lang="it-IT" dirty="0" smtClean="0"/>
+              <a:t> </a:t>
+            </a:r>
+            <a:r>
+              <a:rPr lang="it-IT" dirty="0" err="1" smtClean="0"/>
+              <a:t>observed</a:t>
+            </a:r>
+            <a:r>
+              <a:rPr lang="it-IT" dirty="0" smtClean="0"/>
+              <a:t>, </a:t>
+            </a:r>
+            <a:r>
+              <a:rPr lang="it-IT" dirty="0" err="1" smtClean="0"/>
+              <a:t>evaluate</a:t>
+            </a:r>
+            <a:r>
+              <a:rPr lang="it-IT" dirty="0" smtClean="0"/>
+              <a:t> the </a:t>
+            </a:r>
+          </a:p>
+          <a:p>
+            <a:r>
+              <a:rPr lang="it-IT" dirty="0" err="1" smtClean="0"/>
+              <a:t>marginal</a:t>
+            </a:r>
+            <a:r>
+              <a:rPr lang="it-IT" dirty="0" smtClean="0"/>
+              <a:t> </a:t>
+            </a:r>
+            <a:r>
+              <a:rPr lang="it-IT" dirty="0" err="1" smtClean="0"/>
+              <a:t>distribution</a:t>
+            </a:r>
+            <a:r>
+              <a:rPr lang="it-IT" dirty="0" smtClean="0"/>
+              <a:t> of </a:t>
+            </a:r>
+            <a:r>
+              <a:rPr lang="it-IT" dirty="0" err="1" smtClean="0"/>
+              <a:t>Yn</a:t>
+            </a:r>
+            <a:endParaRPr lang="it-IT" dirty="0"/>
+          </a:p>
+        </p:txBody>
+      </p:sp>
+      <mc:AlternateContent xmlns:mc="http://schemas.openxmlformats.org/markup-compatibility/2006">
+        <mc:Choice xmlns:a14="http://schemas.microsoft.com/office/drawing/2010/main" Requires="a14">
+          <p:sp>
+            <p:nvSpPr>
+              <p:cNvPr id="59" name="CasellaDiTesto 58"/>
+              <p:cNvSpPr txBox="1"/>
+              <p:nvPr/>
+            </p:nvSpPr>
+            <p:spPr>
+              <a:xfrm>
+                <a:off x="2699792" y="971436"/>
+                <a:ext cx="4536504" cy="369332"/>
+              </a:xfrm>
+              <a:prstGeom prst="rect">
+                <a:avLst/>
+              </a:prstGeom>
+              <a:noFill/>
+            </p:spPr>
+            <p:txBody>
+              <a:bodyPr wrap="square" rtlCol="0">
+                <a:spAutoFit/>
+              </a:bodyPr>
+              <a:lstStyle/>
+              <a:p>
+                <a:pPr/>
+                <a14:m>
+                  <m:oMathPara xmlns:m="http://schemas.openxmlformats.org/officeDocument/2006/math">
+                    <m:oMathParaPr>
+                      <m:jc m:val="centerGroup"/>
+                    </m:oMathParaPr>
+                    <m:oMath xmlns:m="http://schemas.openxmlformats.org/officeDocument/2006/math">
+                      <m:r>
+                        <a:rPr lang="it-IT" b="0" i="1" smtClean="0">
+                          <a:latin typeface="Cambria Math"/>
+                        </a:rPr>
+                        <m:t>𝑃</m:t>
+                      </m:r>
+                      <m:d>
+                        <m:dPr>
+                          <m:ctrlPr>
+                            <a:rPr lang="it-IT" b="0" i="1" smtClean="0">
+                              <a:latin typeface="Cambria Math"/>
+                            </a:rPr>
+                          </m:ctrlPr>
+                        </m:dPr>
+                        <m:e>
+                          <m:r>
+                            <a:rPr lang="it-IT" b="0" i="1" smtClean="0">
+                              <a:latin typeface="Cambria Math"/>
+                            </a:rPr>
+                            <m:t>𝑌𝑛</m:t>
+                          </m:r>
+                        </m:e>
+                        <m:e>
+                          <m:r>
+                            <a:rPr lang="it-IT" b="0" i="1" smtClean="0">
+                              <a:latin typeface="Cambria Math"/>
+                            </a:rPr>
+                            <m:t>𝑌</m:t>
+                          </m:r>
+                          <m:r>
+                            <a:rPr lang="it-IT" b="0" i="1" smtClean="0">
+                              <a:latin typeface="Cambria Math"/>
+                            </a:rPr>
+                            <m:t>0=0</m:t>
+                          </m:r>
+                        </m:e>
+                      </m:d>
+                    </m:oMath>
+                  </m:oMathPara>
+                </a14:m>
+                <a:endParaRPr lang="it-IT" dirty="0"/>
+              </a:p>
+            </p:txBody>
+          </p:sp>
+        </mc:Choice>
+        <mc:Fallback>
+          <p:sp>
+            <p:nvSpPr>
+              <p:cNvPr id="59" name="CasellaDiTesto 58"/>
+              <p:cNvSpPr txBox="1">
+                <a:spLocks noRot="1" noChangeAspect="1" noMove="1" noResize="1" noEditPoints="1" noAdjustHandles="1" noChangeArrowheads="1" noChangeShapeType="1" noTextEdit="1"/>
+              </p:cNvSpPr>
+              <p:nvPr/>
+            </p:nvSpPr>
+            <p:spPr>
+              <a:xfrm>
+                <a:off x="2699792" y="971436"/>
+                <a:ext cx="4536504" cy="369332"/>
+              </a:xfrm>
+              <a:prstGeom prst="rect">
+                <a:avLst/>
+              </a:prstGeom>
+              <a:blipFill rotWithShape="1">
+                <a:blip r:embed="rId5"/>
+                <a:stretch>
+                  <a:fillRect/>
+                </a:stretch>
+              </a:blipFill>
+            </p:spPr>
+            <p:txBody>
+              <a:bodyPr/>
+              <a:lstStyle/>
+              <a:p>
+                <a:r>
+                  <a:rPr lang="it-IT">
+                    <a:noFill/>
+                  </a:rPr>
+                  <a:t> </a:t>
+                </a:r>
+              </a:p>
+            </p:txBody>
+          </p:sp>
+        </mc:Fallback>
+      </mc:AlternateContent>
+      <mc:AlternateContent xmlns:mc="http://schemas.openxmlformats.org/markup-compatibility/2006">
+        <mc:Choice xmlns:a14="http://schemas.microsoft.com/office/drawing/2010/main" Requires="a14">
+          <p:graphicFrame>
+            <p:nvGraphicFramePr>
+              <p:cNvPr id="60" name="Tabella 59"/>
+              <p:cNvGraphicFramePr>
+                <a:graphicFrameLocks noGrp="1"/>
+              </p:cNvGraphicFramePr>
+              <p:nvPr>
+                <p:extLst>
+                  <p:ext uri="{D42A27DB-BD31-4B8C-83A1-F6EECF244321}">
+                    <p14:modId xmlns:p14="http://schemas.microsoft.com/office/powerpoint/2010/main" val="2751758381"/>
+                  </p:ext>
+                </p:extLst>
+              </p:nvPr>
+            </p:nvGraphicFramePr>
+            <p:xfrm>
+              <a:off x="3540402" y="2446183"/>
+              <a:ext cx="4032092" cy="1928499"/>
+            </p:xfrm>
+            <a:graphic>
+              <a:graphicData uri="http://schemas.openxmlformats.org/drawingml/2006/table">
+                <a:tbl>
+                  <a:tblPr firstRow="1" bandRow="1">
+                    <a:tableStyleId>{5C22544A-7EE6-4342-B048-85BDC9FD1C3A}</a:tableStyleId>
+                  </a:tblPr>
+                  <a:tblGrid>
+                    <a:gridCol w="1281629"/>
+                    <a:gridCol w="713083"/>
+                    <a:gridCol w="713083"/>
+                    <a:gridCol w="611214"/>
+                    <a:gridCol w="713083"/>
+                  </a:tblGrid>
+                  <a:tr h="433174">
+                    <a:tc>
+                      <a:txBody>
+                        <a:bodyPr/>
+                        <a:lstStyle/>
+                        <a:p>
+                          <a14:m>
+                            <m:oMath xmlns:m="http://schemas.openxmlformats.org/officeDocument/2006/math">
+                              <m:sSub>
+                                <m:sSubPr>
+                                  <m:ctrlPr>
+                                    <a:rPr lang="it-IT" i="1" smtClean="0">
+                                      <a:latin typeface="Cambria Math"/>
+                                    </a:rPr>
+                                  </m:ctrlPr>
+                                </m:sSubPr>
+                                <m:e>
+                                  <m:r>
+                                    <m:rPr>
+                                      <m:sty m:val="p"/>
+                                    </m:rPr>
+                                    <a:rPr lang="el-GR" i="1" smtClean="0">
+                                      <a:latin typeface="Cambria Math"/>
+                                    </a:rPr>
+                                    <m:t>Φ</m:t>
+                                  </m:r>
+                                </m:e>
+                                <m:sub>
+                                  <m:r>
+                                    <m:rPr>
+                                      <m:nor/>
+                                    </m:rPr>
+                                    <a:rPr lang="it-IT" b="1" i="1" dirty="0" smtClean="0"/>
+                                    <m:t>i</m:t>
+                                  </m:r>
+                                </m:sub>
+                              </m:sSub>
+                            </m:oMath>
+                          </a14:m>
+                          <a:r>
+                            <a:rPr lang="it-IT" dirty="0" smtClean="0"/>
+                            <a:t> </a:t>
+                          </a:r>
+                          <a:r>
+                            <a:rPr lang="it-IT" dirty="0" err="1" smtClean="0"/>
+                            <a:t>Yi</a:t>
+                          </a:r>
+                          <a:r>
+                            <a:rPr lang="it-IT" dirty="0" smtClean="0"/>
+                            <a:t>\Yi+1</a:t>
+                          </a:r>
+                          <a:endParaRPr lang="it-IT" dirty="0"/>
+                        </a:p>
+                      </a:txBody>
+                      <a:tcPr/>
+                    </a:tc>
+                    <a:tc>
+                      <a:txBody>
+                        <a:bodyPr/>
+                        <a:lstStyle/>
+                        <a:p>
+                          <a:r>
+                            <a:rPr lang="it-IT" dirty="0" smtClean="0"/>
+                            <a:t>0</a:t>
+                          </a:r>
+                          <a:endParaRPr lang="it-IT" dirty="0"/>
+                        </a:p>
+                      </a:txBody>
+                      <a:tcPr/>
+                    </a:tc>
+                    <a:tc>
+                      <a:txBody>
+                        <a:bodyPr/>
+                        <a:lstStyle/>
+                        <a:p>
+                          <a:r>
+                            <a:rPr lang="it-IT" dirty="0" smtClean="0"/>
+                            <a:t>1</a:t>
+                          </a:r>
+                          <a:endParaRPr lang="it-IT" dirty="0"/>
+                        </a:p>
+                      </a:txBody>
+                      <a:tcPr/>
+                    </a:tc>
+                    <a:tc>
+                      <a:txBody>
+                        <a:bodyPr/>
+                        <a:lstStyle/>
+                        <a:p>
+                          <a14:m>
+                            <m:oMathPara xmlns:m="http://schemas.openxmlformats.org/officeDocument/2006/math">
+                              <m:oMathParaPr>
+                                <m:jc m:val="centerGroup"/>
+                              </m:oMathParaPr>
+                              <m:oMath xmlns:m="http://schemas.openxmlformats.org/officeDocument/2006/math">
+                                <m:r>
+                                  <a:rPr lang="it-IT" i="1" smtClean="0">
+                                    <a:latin typeface="Cambria Math"/>
+                                    <a:ea typeface="Cambria Math"/>
+                                  </a:rPr>
+                                  <m:t>⋯</m:t>
+                                </m:r>
+                              </m:oMath>
+                            </m:oMathPara>
+                          </a14:m>
+                          <a:endParaRPr lang="it-IT" dirty="0"/>
+                        </a:p>
+                      </a:txBody>
+                      <a:tcPr/>
+                    </a:tc>
+                    <a:tc>
+                      <a:txBody>
+                        <a:bodyPr/>
+                        <a:lstStyle/>
+                        <a:p>
+                          <a:r>
+                            <a:rPr lang="it-IT" dirty="0" smtClean="0"/>
+                            <a:t>m</a:t>
+                          </a:r>
+                          <a:endParaRPr lang="it-IT" dirty="0"/>
+                        </a:p>
+                      </a:txBody>
+                      <a:tcPr/>
+                    </a:tc>
+                  </a:tr>
+                  <a:tr h="383242">
+                    <a:tc>
+                      <a:txBody>
+                        <a:bodyPr/>
+                        <a:lstStyle/>
+                        <a:p>
+                          <a:r>
+                            <a:rPr lang="it-IT" dirty="0" smtClean="0"/>
+                            <a:t>0</a:t>
+                          </a:r>
+                          <a:endParaRPr lang="it-IT" dirty="0"/>
+                        </a:p>
+                      </a:txBody>
+                      <a:tcPr/>
+                    </a:tc>
+                    <a:tc>
+                      <a:txBody>
+                        <a:bodyPr/>
+                        <a:lstStyle/>
+                        <a:p>
+                          <a:r>
+                            <a:rPr lang="it-IT" dirty="0" smtClean="0"/>
+                            <a:t>1</a:t>
+                          </a:r>
+                          <a:endParaRPr lang="it-IT" dirty="0"/>
+                        </a:p>
+                      </a:txBody>
+                      <a:tcPr/>
+                    </a:tc>
+                    <a:tc>
+                      <a:txBody>
+                        <a:bodyPr/>
+                        <a:lstStyle/>
+                        <a:p>
+                          <a:r>
+                            <a:rPr lang="it-IT" dirty="0" smtClean="0"/>
+                            <a:t>0</a:t>
+                          </a:r>
+                          <a:endParaRPr lang="it-IT" dirty="0"/>
+                        </a:p>
+                      </a:txBody>
+                      <a:tcPr/>
+                    </a:tc>
+                    <a:tc>
+                      <a:txBody>
+                        <a:bodyPr/>
+                        <a:lstStyle/>
+                        <a:p>
+                          <a:endParaRPr lang="it-IT" dirty="0"/>
+                        </a:p>
+                      </a:txBody>
+                      <a:tcPr/>
+                    </a:tc>
+                    <a:tc>
+                      <a:txBody>
+                        <a:bodyPr/>
+                        <a:lstStyle/>
+                        <a:p>
+                          <a:r>
+                            <a:rPr lang="it-IT" dirty="0" smtClean="0"/>
+                            <a:t>0</a:t>
+                          </a:r>
+                          <a:endParaRPr lang="it-IT" dirty="0"/>
+                        </a:p>
+                      </a:txBody>
+                      <a:tcPr/>
+                    </a:tc>
+                  </a:tr>
+                  <a:tr h="324442">
+                    <a:tc>
+                      <a:txBody>
+                        <a:bodyPr/>
+                        <a:lstStyle/>
+                        <a:p>
+                          <a:r>
+                            <a:rPr lang="it-IT" dirty="0" smtClean="0"/>
+                            <a:t>1</a:t>
+                          </a:r>
+                          <a:endParaRPr lang="it-IT" dirty="0"/>
+                        </a:p>
+                      </a:txBody>
+                      <a:tcPr/>
+                    </a:tc>
+                    <a:tc>
+                      <a:txBody>
+                        <a:bodyPr/>
+                        <a:lstStyle/>
+                        <a:p>
+                          <a:r>
+                            <a:rPr lang="it-IT" dirty="0" smtClean="0"/>
+                            <a:t>0</a:t>
+                          </a:r>
+                          <a:endParaRPr lang="it-IT" dirty="0"/>
+                        </a:p>
+                      </a:txBody>
+                      <a:tcPr/>
+                    </a:tc>
+                    <a:tc>
+                      <a:txBody>
+                        <a:bodyPr/>
+                        <a:lstStyle/>
+                        <a:p>
+                          <a:r>
+                            <a:rPr lang="it-IT" dirty="0" smtClean="0"/>
+                            <a:t>1</a:t>
+                          </a:r>
+                          <a:endParaRPr lang="it-IT" dirty="0"/>
+                        </a:p>
+                      </a:txBody>
+                      <a:tcPr/>
+                    </a:tc>
+                    <a:tc>
+                      <a:txBody>
+                        <a:bodyPr/>
+                        <a:lstStyle/>
+                        <a:p>
+                          <a:endParaRPr lang="it-IT" dirty="0"/>
+                        </a:p>
+                      </a:txBody>
+                      <a:tcPr/>
+                    </a:tc>
+                    <a:tc>
+                      <a:txBody>
+                        <a:bodyPr/>
+                        <a:lstStyle/>
+                        <a:p>
+                          <a:r>
+                            <a:rPr lang="it-IT" dirty="0" smtClean="0"/>
+                            <a:t>0</a:t>
+                          </a:r>
+                          <a:endParaRPr lang="it-IT" dirty="0"/>
+                        </a:p>
+                      </a:txBody>
+                      <a:tcPr/>
+                    </a:tc>
+                  </a:tr>
+                  <a:tr h="378168">
+                    <a:tc>
+                      <a:txBody>
+                        <a:bodyPr/>
+                        <a:lstStyle/>
+                        <a:p>
+                          <a:pPr/>
+                          <a14:m>
+                            <m:oMathPara xmlns:m="http://schemas.openxmlformats.org/officeDocument/2006/math">
+                              <m:oMathParaPr>
+                                <m:jc m:val="left"/>
+                              </m:oMathParaPr>
+                              <m:oMath xmlns:m="http://schemas.openxmlformats.org/officeDocument/2006/math">
+                                <m:r>
+                                  <a:rPr lang="it-IT" i="1" smtClean="0">
+                                    <a:latin typeface="Cambria Math"/>
+                                    <a:ea typeface="Cambria Math"/>
+                                  </a:rPr>
+                                  <m:t>⋮</m:t>
+                                </m:r>
+                              </m:oMath>
+                            </m:oMathPara>
+                          </a14:m>
+                          <a:endParaRPr lang="it-IT" dirty="0"/>
+                        </a:p>
+                      </a:txBody>
+                      <a:tcPr/>
+                    </a:tc>
+                    <a:tc>
+                      <a:txBody>
+                        <a:bodyPr/>
+                        <a:lstStyle/>
+                        <a:p>
+                          <a:endParaRPr lang="it-IT" dirty="0"/>
+                        </a:p>
+                      </a:txBody>
+                      <a:tcPr/>
+                    </a:tc>
+                    <a:tc>
+                      <a:txBody>
+                        <a:bodyPr/>
+                        <a:lstStyle/>
+                        <a:p>
+                          <a:endParaRPr lang="it-IT" dirty="0"/>
+                        </a:p>
+                      </a:txBody>
+                      <a:tcPr/>
+                    </a:tc>
+                    <a:tc>
+                      <a:txBody>
+                        <a:bodyPr/>
+                        <a:lstStyle/>
+                        <a:p>
+                          <a14:m>
+                            <m:oMathPara xmlns:m="http://schemas.openxmlformats.org/officeDocument/2006/math">
+                              <m:oMathParaPr>
+                                <m:jc m:val="centerGroup"/>
+                              </m:oMathParaPr>
+                              <m:oMath xmlns:m="http://schemas.openxmlformats.org/officeDocument/2006/math">
+                                <m:r>
+                                  <a:rPr lang="it-IT" i="1" smtClean="0">
+                                    <a:latin typeface="Cambria Math"/>
+                                    <a:ea typeface="Cambria Math"/>
+                                  </a:rPr>
+                                  <m:t>⋱</m:t>
+                                </m:r>
+                              </m:oMath>
+                            </m:oMathPara>
+                          </a14:m>
+                          <a:endParaRPr lang="it-IT" dirty="0"/>
+                        </a:p>
+                      </a:txBody>
+                      <a:tcPr/>
+                    </a:tc>
+                    <a:tc>
+                      <a:txBody>
+                        <a:bodyPr/>
+                        <a:lstStyle/>
+                        <a:p>
+                          <a:endParaRPr lang="it-IT" dirty="0"/>
+                        </a:p>
+                      </a:txBody>
+                      <a:tcPr/>
+                    </a:tc>
+                  </a:tr>
+                  <a:tr h="368155">
+                    <a:tc>
+                      <a:txBody>
+                        <a:bodyPr/>
+                        <a:lstStyle/>
+                        <a:p>
+                          <a:r>
+                            <a:rPr lang="it-IT" dirty="0" smtClean="0"/>
+                            <a:t>m</a:t>
+                          </a:r>
+                          <a:endParaRPr lang="it-IT" dirty="0"/>
+                        </a:p>
+                      </a:txBody>
+                      <a:tcPr/>
+                    </a:tc>
+                    <a:tc>
+                      <a:txBody>
+                        <a:bodyPr/>
+                        <a:lstStyle/>
+                        <a:p>
+                          <a:r>
+                            <a:rPr lang="it-IT" dirty="0" smtClean="0"/>
+                            <a:t>0</a:t>
+                          </a:r>
+                          <a:endParaRPr lang="it-IT" dirty="0"/>
+                        </a:p>
+                      </a:txBody>
+                      <a:tcPr/>
+                    </a:tc>
+                    <a:tc>
+                      <a:txBody>
+                        <a:bodyPr/>
+                        <a:lstStyle/>
+                        <a:p>
+                          <a:r>
+                            <a:rPr lang="it-IT" dirty="0" smtClean="0"/>
+                            <a:t>0</a:t>
+                          </a:r>
+                          <a:endParaRPr lang="it-IT" dirty="0"/>
+                        </a:p>
+                      </a:txBody>
+                      <a:tcPr/>
+                    </a:tc>
+                    <a:tc>
+                      <a:txBody>
+                        <a:bodyPr/>
+                        <a:lstStyle/>
+                        <a:p>
+                          <a:endParaRPr lang="it-IT" dirty="0"/>
+                        </a:p>
+                      </a:txBody>
+                      <a:tcPr/>
+                    </a:tc>
+                    <a:tc>
+                      <a:txBody>
+                        <a:bodyPr/>
+                        <a:lstStyle/>
+                        <a:p>
+                          <a:r>
+                            <a:rPr lang="it-IT" dirty="0" smtClean="0"/>
+                            <a:t>1</a:t>
+                          </a:r>
+                          <a:endParaRPr lang="it-IT" dirty="0"/>
+                        </a:p>
+                      </a:txBody>
+                      <a:tcPr/>
+                    </a:tc>
+                  </a:tr>
+                </a:tbl>
+              </a:graphicData>
+            </a:graphic>
+          </p:graphicFrame>
+        </mc:Choice>
+        <mc:Fallback>
+          <p:graphicFrame>
+            <p:nvGraphicFramePr>
+              <p:cNvPr id="60" name="Tabella 59"/>
+              <p:cNvGraphicFramePr>
+                <a:graphicFrameLocks noGrp="1"/>
+              </p:cNvGraphicFramePr>
+              <p:nvPr>
+                <p:extLst>
+                  <p:ext uri="{D42A27DB-BD31-4B8C-83A1-F6EECF244321}">
+                    <p14:modId xmlns:p14="http://schemas.microsoft.com/office/powerpoint/2010/main" val="2751758381"/>
+                  </p:ext>
+                </p:extLst>
+              </p:nvPr>
+            </p:nvGraphicFramePr>
+            <p:xfrm>
+              <a:off x="3540402" y="2446183"/>
+              <a:ext cx="4032092" cy="1928499"/>
+            </p:xfrm>
+            <a:graphic>
+              <a:graphicData uri="http://schemas.openxmlformats.org/drawingml/2006/table">
+                <a:tbl>
+                  <a:tblPr firstRow="1" bandRow="1">
+                    <a:tableStyleId>{5C22544A-7EE6-4342-B048-85BDC9FD1C3A}</a:tableStyleId>
+                  </a:tblPr>
+                  <a:tblGrid>
+                    <a:gridCol w="1281629"/>
+                    <a:gridCol w="713083"/>
+                    <a:gridCol w="713083"/>
+                    <a:gridCol w="611214"/>
+                    <a:gridCol w="713083"/>
+                  </a:tblGrid>
+                  <a:tr h="433174">
+                    <a:tc>
+                      <a:txBody>
+                        <a:bodyPr/>
+                        <a:lstStyle/>
+                        <a:p>
+                          <a:endParaRPr lang="it-IT"/>
+                        </a:p>
+                      </a:txBody>
+                      <a:tcPr>
+                        <a:blipFill rotWithShape="1">
+                          <a:blip r:embed="rId6"/>
+                          <a:stretch>
+                            <a:fillRect l="-476" t="-7042" r="-215238" b="-367606"/>
+                          </a:stretch>
+                        </a:blipFill>
+                      </a:tcPr>
+                    </a:tc>
+                    <a:tc>
+                      <a:txBody>
+                        <a:bodyPr/>
+                        <a:lstStyle/>
+                        <a:p>
+                          <a:r>
+                            <a:rPr lang="it-IT" dirty="0" smtClean="0"/>
+                            <a:t>0</a:t>
+                          </a:r>
+                          <a:endParaRPr lang="it-IT" dirty="0"/>
+                        </a:p>
+                      </a:txBody>
+                      <a:tcPr/>
+                    </a:tc>
+                    <a:tc>
+                      <a:txBody>
+                        <a:bodyPr/>
+                        <a:lstStyle/>
+                        <a:p>
+                          <a:r>
+                            <a:rPr lang="it-IT" dirty="0" smtClean="0"/>
+                            <a:t>1</a:t>
+                          </a:r>
+                          <a:endParaRPr lang="it-IT" dirty="0"/>
+                        </a:p>
+                      </a:txBody>
+                      <a:tcPr/>
+                    </a:tc>
+                    <a:tc>
+                      <a:txBody>
+                        <a:bodyPr/>
+                        <a:lstStyle/>
+                        <a:p>
+                          <a:endParaRPr lang="it-IT"/>
+                        </a:p>
+                      </a:txBody>
+                      <a:tcPr>
+                        <a:blipFill rotWithShape="1">
+                          <a:blip r:embed="rId6"/>
+                          <a:stretch>
+                            <a:fillRect l="-445000" t="-7042" r="-118000" b="-367606"/>
+                          </a:stretch>
+                        </a:blipFill>
+                      </a:tcPr>
+                    </a:tc>
+                    <a:tc>
+                      <a:txBody>
+                        <a:bodyPr/>
+                        <a:lstStyle/>
+                        <a:p>
+                          <a:r>
+                            <a:rPr lang="it-IT" dirty="0" smtClean="0"/>
+                            <a:t>m</a:t>
+                          </a:r>
+                          <a:endParaRPr lang="it-IT" dirty="0"/>
+                        </a:p>
+                      </a:txBody>
+                      <a:tcPr/>
+                    </a:tc>
+                  </a:tr>
+                  <a:tr h="383242">
+                    <a:tc>
+                      <a:txBody>
+                        <a:bodyPr/>
+                        <a:lstStyle/>
+                        <a:p>
+                          <a:r>
+                            <a:rPr lang="it-IT" dirty="0" smtClean="0"/>
+                            <a:t>0</a:t>
+                          </a:r>
+                          <a:endParaRPr lang="it-IT" dirty="0"/>
+                        </a:p>
+                      </a:txBody>
+                      <a:tcPr/>
+                    </a:tc>
+                    <a:tc>
+                      <a:txBody>
+                        <a:bodyPr/>
+                        <a:lstStyle/>
+                        <a:p>
+                          <a:r>
+                            <a:rPr lang="it-IT" dirty="0" smtClean="0"/>
+                            <a:t>1</a:t>
+                          </a:r>
+                          <a:endParaRPr lang="it-IT" dirty="0"/>
+                        </a:p>
+                      </a:txBody>
+                      <a:tcPr/>
+                    </a:tc>
+                    <a:tc>
+                      <a:txBody>
+                        <a:bodyPr/>
+                        <a:lstStyle/>
+                        <a:p>
+                          <a:r>
+                            <a:rPr lang="it-IT" dirty="0" smtClean="0"/>
+                            <a:t>0</a:t>
+                          </a:r>
+                          <a:endParaRPr lang="it-IT" dirty="0"/>
+                        </a:p>
+                      </a:txBody>
+                      <a:tcPr/>
+                    </a:tc>
+                    <a:tc>
+                      <a:txBody>
+                        <a:bodyPr/>
+                        <a:lstStyle/>
+                        <a:p>
+                          <a:endParaRPr lang="it-IT" dirty="0"/>
+                        </a:p>
+                      </a:txBody>
+                      <a:tcPr/>
+                    </a:tc>
+                    <a:tc>
+                      <a:txBody>
+                        <a:bodyPr/>
+                        <a:lstStyle/>
+                        <a:p>
+                          <a:r>
+                            <a:rPr lang="it-IT" dirty="0" smtClean="0"/>
+                            <a:t>0</a:t>
+                          </a:r>
+                          <a:endParaRPr lang="it-IT" dirty="0"/>
+                        </a:p>
+                      </a:txBody>
+                      <a:tcPr/>
+                    </a:tc>
+                  </a:tr>
+                  <a:tr h="365760">
+                    <a:tc>
+                      <a:txBody>
+                        <a:bodyPr/>
+                        <a:lstStyle/>
+                        <a:p>
+                          <a:r>
+                            <a:rPr lang="it-IT" dirty="0" smtClean="0"/>
+                            <a:t>1</a:t>
+                          </a:r>
+                          <a:endParaRPr lang="it-IT" dirty="0"/>
+                        </a:p>
+                      </a:txBody>
+                      <a:tcPr/>
+                    </a:tc>
+                    <a:tc>
+                      <a:txBody>
+                        <a:bodyPr/>
+                        <a:lstStyle/>
+                        <a:p>
+                          <a:r>
+                            <a:rPr lang="it-IT" dirty="0" smtClean="0"/>
+                            <a:t>0</a:t>
+                          </a:r>
+                          <a:endParaRPr lang="it-IT" dirty="0"/>
+                        </a:p>
+                      </a:txBody>
+                      <a:tcPr/>
+                    </a:tc>
+                    <a:tc>
+                      <a:txBody>
+                        <a:bodyPr/>
+                        <a:lstStyle/>
+                        <a:p>
+                          <a:r>
+                            <a:rPr lang="it-IT" dirty="0" smtClean="0"/>
+                            <a:t>1</a:t>
+                          </a:r>
+                          <a:endParaRPr lang="it-IT" dirty="0"/>
+                        </a:p>
+                      </a:txBody>
+                      <a:tcPr/>
+                    </a:tc>
+                    <a:tc>
+                      <a:txBody>
+                        <a:bodyPr/>
+                        <a:lstStyle/>
+                        <a:p>
+                          <a:endParaRPr lang="it-IT" dirty="0"/>
+                        </a:p>
+                      </a:txBody>
+                      <a:tcPr/>
+                    </a:tc>
+                    <a:tc>
+                      <a:txBody>
+                        <a:bodyPr/>
+                        <a:lstStyle/>
+                        <a:p>
+                          <a:r>
+                            <a:rPr lang="it-IT" dirty="0" smtClean="0"/>
+                            <a:t>0</a:t>
+                          </a:r>
+                          <a:endParaRPr lang="it-IT" dirty="0"/>
+                        </a:p>
+                      </a:txBody>
+                      <a:tcPr/>
+                    </a:tc>
+                  </a:tr>
+                  <a:tr h="378168">
+                    <a:tc>
+                      <a:txBody>
+                        <a:bodyPr/>
+                        <a:lstStyle/>
+                        <a:p>
+                          <a:endParaRPr lang="it-IT"/>
+                        </a:p>
+                      </a:txBody>
+                      <a:tcPr>
+                        <a:blipFill rotWithShape="1">
+                          <a:blip r:embed="rId6"/>
+                          <a:stretch>
+                            <a:fillRect l="-476" t="-320968" r="-215238" b="-122581"/>
+                          </a:stretch>
+                        </a:blipFill>
+                      </a:tcPr>
+                    </a:tc>
+                    <a:tc>
+                      <a:txBody>
+                        <a:bodyPr/>
+                        <a:lstStyle/>
+                        <a:p>
+                          <a:endParaRPr lang="it-IT" dirty="0"/>
+                        </a:p>
+                      </a:txBody>
+                      <a:tcPr/>
+                    </a:tc>
+                    <a:tc>
+                      <a:txBody>
+                        <a:bodyPr/>
+                        <a:lstStyle/>
+                        <a:p>
+                          <a:endParaRPr lang="it-IT" dirty="0"/>
+                        </a:p>
+                      </a:txBody>
+                      <a:tcPr/>
+                    </a:tc>
+                    <a:tc>
+                      <a:txBody>
+                        <a:bodyPr/>
+                        <a:lstStyle/>
+                        <a:p>
+                          <a:endParaRPr lang="it-IT"/>
+                        </a:p>
+                      </a:txBody>
+                      <a:tcPr>
+                        <a:blipFill rotWithShape="1">
+                          <a:blip r:embed="rId6"/>
+                          <a:stretch>
+                            <a:fillRect l="-445000" t="-320968" r="-118000" b="-122581"/>
+                          </a:stretch>
+                        </a:blipFill>
+                      </a:tcPr>
+                    </a:tc>
+                    <a:tc>
+                      <a:txBody>
+                        <a:bodyPr/>
+                        <a:lstStyle/>
+                        <a:p>
+                          <a:endParaRPr lang="it-IT" dirty="0"/>
+                        </a:p>
+                      </a:txBody>
+                      <a:tcPr/>
+                    </a:tc>
+                  </a:tr>
+                  <a:tr h="368155">
+                    <a:tc>
+                      <a:txBody>
+                        <a:bodyPr/>
+                        <a:lstStyle/>
+                        <a:p>
+                          <a:r>
+                            <a:rPr lang="it-IT" dirty="0" smtClean="0"/>
+                            <a:t>m</a:t>
+                          </a:r>
+                          <a:endParaRPr lang="it-IT" dirty="0"/>
+                        </a:p>
+                      </a:txBody>
+                      <a:tcPr/>
+                    </a:tc>
+                    <a:tc>
+                      <a:txBody>
+                        <a:bodyPr/>
+                        <a:lstStyle/>
+                        <a:p>
+                          <a:r>
+                            <a:rPr lang="it-IT" dirty="0" smtClean="0"/>
+                            <a:t>0</a:t>
+                          </a:r>
+                          <a:endParaRPr lang="it-IT" dirty="0"/>
+                        </a:p>
+                      </a:txBody>
+                      <a:tcPr/>
+                    </a:tc>
+                    <a:tc>
+                      <a:txBody>
+                        <a:bodyPr/>
+                        <a:lstStyle/>
+                        <a:p>
+                          <a:r>
+                            <a:rPr lang="it-IT" dirty="0" smtClean="0"/>
+                            <a:t>0</a:t>
+                          </a:r>
+                          <a:endParaRPr lang="it-IT" dirty="0"/>
+                        </a:p>
+                      </a:txBody>
+                      <a:tcPr/>
+                    </a:tc>
+                    <a:tc>
+                      <a:txBody>
+                        <a:bodyPr/>
+                        <a:lstStyle/>
+                        <a:p>
+                          <a:endParaRPr lang="it-IT" dirty="0"/>
+                        </a:p>
+                      </a:txBody>
+                      <a:tcPr/>
+                    </a:tc>
+                    <a:tc>
+                      <a:txBody>
+                        <a:bodyPr/>
+                        <a:lstStyle/>
+                        <a:p>
+                          <a:r>
+                            <a:rPr lang="it-IT" dirty="0" smtClean="0"/>
+                            <a:t>1</a:t>
+                          </a:r>
+                          <a:endParaRPr lang="it-IT" dirty="0"/>
+                        </a:p>
+                      </a:txBody>
+                      <a:tcPr/>
+                    </a:tc>
+                  </a:tr>
+                </a:tbl>
+              </a:graphicData>
+            </a:graphic>
+          </p:graphicFrame>
+        </mc:Fallback>
+      </mc:AlternateContent>
+      <mc:AlternateContent xmlns:mc="http://schemas.openxmlformats.org/markup-compatibility/2006">
+        <mc:Choice xmlns:a14="http://schemas.microsoft.com/office/drawing/2010/main" Requires="a14">
+          <p:sp>
+            <p:nvSpPr>
+              <p:cNvPr id="61" name="CasellaDiTesto 60"/>
+              <p:cNvSpPr txBox="1"/>
+              <p:nvPr/>
+            </p:nvSpPr>
+            <p:spPr>
+              <a:xfrm>
+                <a:off x="2123728" y="4437112"/>
+                <a:ext cx="4536504" cy="369332"/>
+              </a:xfrm>
+              <a:prstGeom prst="rect">
+                <a:avLst/>
+              </a:prstGeom>
+              <a:noFill/>
+            </p:spPr>
+            <p:txBody>
+              <a:bodyPr wrap="square" rtlCol="0">
+                <a:spAutoFit/>
+              </a:bodyPr>
+              <a:lstStyle/>
+              <a:p>
+                <a:pPr/>
+                <a14:m>
+                  <m:oMathPara xmlns:m="http://schemas.openxmlformats.org/officeDocument/2006/math">
+                    <m:oMathParaPr>
+                      <m:jc m:val="centerGroup"/>
+                    </m:oMathParaPr>
+                    <m:oMath xmlns:m="http://schemas.openxmlformats.org/officeDocument/2006/math">
+                      <m:sSub>
+                        <m:sSubPr>
+                          <m:ctrlPr>
+                            <a:rPr lang="it-IT" i="1" smtClean="0">
+                              <a:latin typeface="Cambria Math"/>
+                            </a:rPr>
+                          </m:ctrlPr>
+                        </m:sSubPr>
+                        <m:e>
+                          <m:r>
+                            <a:rPr lang="az-Cyrl-AZ" i="1">
+                              <a:latin typeface="Cambria Math"/>
+                            </a:rPr>
+                            <m:t>ѱ</m:t>
+                          </m:r>
+                        </m:e>
+                        <m:sub>
+                          <m:r>
+                            <a:rPr lang="it-IT" b="0" i="1" smtClean="0">
+                              <a:latin typeface="Cambria Math"/>
+                            </a:rPr>
+                            <m:t>𝑖</m:t>
+                          </m:r>
+                        </m:sub>
+                      </m:sSub>
+                      <m:r>
+                        <a:rPr lang="it-IT" b="0" i="1" smtClean="0">
+                          <a:latin typeface="Cambria Math"/>
+                        </a:rPr>
+                        <m:t>=</m:t>
+                      </m:r>
+                      <m:r>
+                        <m:rPr>
+                          <m:sty m:val="p"/>
+                        </m:rPr>
+                        <a:rPr lang="it-IT" b="0" i="0" smtClean="0">
+                          <a:latin typeface="Cambria Math"/>
+                        </a:rPr>
+                        <m:t>exp</m:t>
+                      </m:r>
+                      <m:r>
+                        <a:rPr lang="it-IT" b="0" i="1" smtClean="0">
+                          <a:latin typeface="Cambria Math"/>
+                        </a:rPr>
+                        <m:t>⁡(</m:t>
+                      </m:r>
+                      <m:sSub>
+                        <m:sSubPr>
+                          <m:ctrlPr>
+                            <a:rPr lang="it-IT" i="1">
+                              <a:latin typeface="Cambria Math"/>
+                            </a:rPr>
+                          </m:ctrlPr>
+                        </m:sSubPr>
+                        <m:e>
+                          <m:r>
+                            <m:rPr>
+                              <m:sty m:val="p"/>
+                            </m:rPr>
+                            <a:rPr lang="el-GR" i="1">
+                              <a:latin typeface="Cambria Math"/>
+                            </a:rPr>
+                            <m:t>Φ</m:t>
+                          </m:r>
+                        </m:e>
+                        <m:sub>
+                          <m:r>
+                            <a:rPr lang="it-IT" b="0" i="1" smtClean="0">
+                              <a:latin typeface="Cambria Math"/>
+                            </a:rPr>
+                            <m:t>𝑖</m:t>
+                          </m:r>
+                        </m:sub>
+                      </m:sSub>
+                      <m:r>
+                        <a:rPr lang="it-IT" b="0" i="1" smtClean="0">
+                          <a:latin typeface="Cambria Math"/>
+                        </a:rPr>
+                        <m:t>∗ </m:t>
+                      </m:r>
+                      <m:r>
+                        <a:rPr lang="it-IT" b="0" i="1" smtClean="0">
+                          <a:latin typeface="Cambria Math"/>
+                        </a:rPr>
+                        <m:t>𝑤</m:t>
+                      </m:r>
+                      <m:r>
+                        <a:rPr lang="it-IT" b="0" i="1" smtClean="0">
+                          <a:latin typeface="Cambria Math"/>
+                        </a:rPr>
+                        <m:t>)</m:t>
+                      </m:r>
+                    </m:oMath>
+                  </m:oMathPara>
+                </a14:m>
+                <a:endParaRPr lang="it-IT" dirty="0"/>
+              </a:p>
+            </p:txBody>
+          </p:sp>
+        </mc:Choice>
+        <mc:Fallback>
+          <p:sp>
+            <p:nvSpPr>
+              <p:cNvPr id="61" name="CasellaDiTesto 60"/>
+              <p:cNvSpPr txBox="1">
+                <a:spLocks noRot="1" noChangeAspect="1" noMove="1" noResize="1" noEditPoints="1" noAdjustHandles="1" noChangeArrowheads="1" noChangeShapeType="1" noTextEdit="1"/>
+              </p:cNvSpPr>
+              <p:nvPr/>
+            </p:nvSpPr>
+            <p:spPr>
+              <a:xfrm>
+                <a:off x="2123728" y="4437112"/>
+                <a:ext cx="4536504" cy="369332"/>
+              </a:xfrm>
+              <a:prstGeom prst="rect">
+                <a:avLst/>
+              </a:prstGeom>
+              <a:blipFill rotWithShape="1">
+                <a:blip r:embed="rId7"/>
+                <a:stretch>
+                  <a:fillRect b="-13333"/>
+                </a:stretch>
+              </a:blipFill>
+            </p:spPr>
+            <p:txBody>
+              <a:bodyPr/>
+              <a:lstStyle/>
+              <a:p>
+                <a:r>
+                  <a:rPr lang="it-IT">
+                    <a:noFill/>
+                  </a:rPr>
+                  <a:t> </a:t>
+                </a:r>
+              </a:p>
+            </p:txBody>
+          </p:sp>
+        </mc:Fallback>
+      </mc:AlternateContent>
+    </p:spTree>
+    <p:extLst>
+      <p:ext uri="{BB962C8B-B14F-4D97-AF65-F5344CB8AC3E}">
+        <p14:creationId xmlns:p14="http://schemas.microsoft.com/office/powerpoint/2010/main" val="1081433818"/>
       </p:ext>
     </p:extLst>
   </p:cSld>

</xml_diff>

<commit_message>
Marginal inference for group of variables inserted
</commit_message>
<xml_diff>
--- a/content/Sample/Sample_02_Belief_propagation_A/README.pptx
+++ b/content/Sample/Sample_02_Belief_propagation_A/README.pptx
@@ -296,7 +296,7 @@
           <a:p>
             <a:fld id="{BC4DB8D6-4652-4C93-A02F-E71A49F8F853}" type="datetimeFigureOut">
               <a:rPr lang="it-IT" smtClean="0"/>
-              <a:t>29/05/2019</a:t>
+              <a:t>15/07/2019</a:t>
             </a:fld>
             <a:endParaRPr lang="it-IT"/>
           </a:p>
@@ -466,7 +466,7 @@
           <a:p>
             <a:fld id="{BC4DB8D6-4652-4C93-A02F-E71A49F8F853}" type="datetimeFigureOut">
               <a:rPr lang="it-IT" smtClean="0"/>
-              <a:t>29/05/2019</a:t>
+              <a:t>15/07/2019</a:t>
             </a:fld>
             <a:endParaRPr lang="it-IT"/>
           </a:p>
@@ -646,7 +646,7 @@
           <a:p>
             <a:fld id="{BC4DB8D6-4652-4C93-A02F-E71A49F8F853}" type="datetimeFigureOut">
               <a:rPr lang="it-IT" smtClean="0"/>
-              <a:t>29/05/2019</a:t>
+              <a:t>15/07/2019</a:t>
             </a:fld>
             <a:endParaRPr lang="it-IT"/>
           </a:p>
@@ -816,7 +816,7 @@
           <a:p>
             <a:fld id="{BC4DB8D6-4652-4C93-A02F-E71A49F8F853}" type="datetimeFigureOut">
               <a:rPr lang="it-IT" smtClean="0"/>
-              <a:t>29/05/2019</a:t>
+              <a:t>15/07/2019</a:t>
             </a:fld>
             <a:endParaRPr lang="it-IT"/>
           </a:p>
@@ -1062,7 +1062,7 @@
           <a:p>
             <a:fld id="{BC4DB8D6-4652-4C93-A02F-E71A49F8F853}" type="datetimeFigureOut">
               <a:rPr lang="it-IT" smtClean="0"/>
-              <a:t>29/05/2019</a:t>
+              <a:t>15/07/2019</a:t>
             </a:fld>
             <a:endParaRPr lang="it-IT"/>
           </a:p>
@@ -1350,7 +1350,7 @@
           <a:p>
             <a:fld id="{BC4DB8D6-4652-4C93-A02F-E71A49F8F853}" type="datetimeFigureOut">
               <a:rPr lang="it-IT" smtClean="0"/>
-              <a:t>29/05/2019</a:t>
+              <a:t>15/07/2019</a:t>
             </a:fld>
             <a:endParaRPr lang="it-IT"/>
           </a:p>
@@ -1772,7 +1772,7 @@
           <a:p>
             <a:fld id="{BC4DB8D6-4652-4C93-A02F-E71A49F8F853}" type="datetimeFigureOut">
               <a:rPr lang="it-IT" smtClean="0"/>
-              <a:t>29/05/2019</a:t>
+              <a:t>15/07/2019</a:t>
             </a:fld>
             <a:endParaRPr lang="it-IT"/>
           </a:p>
@@ -1890,7 +1890,7 @@
           <a:p>
             <a:fld id="{BC4DB8D6-4652-4C93-A02F-E71A49F8F853}" type="datetimeFigureOut">
               <a:rPr lang="it-IT" smtClean="0"/>
-              <a:t>29/05/2019</a:t>
+              <a:t>15/07/2019</a:t>
             </a:fld>
             <a:endParaRPr lang="it-IT"/>
           </a:p>
@@ -1985,7 +1985,7 @@
           <a:p>
             <a:fld id="{BC4DB8D6-4652-4C93-A02F-E71A49F8F853}" type="datetimeFigureOut">
               <a:rPr lang="it-IT" smtClean="0"/>
-              <a:t>29/05/2019</a:t>
+              <a:t>15/07/2019</a:t>
             </a:fld>
             <a:endParaRPr lang="it-IT"/>
           </a:p>
@@ -2262,7 +2262,7 @@
           <a:p>
             <a:fld id="{BC4DB8D6-4652-4C93-A02F-E71A49F8F853}" type="datetimeFigureOut">
               <a:rPr lang="it-IT" smtClean="0"/>
-              <a:t>29/05/2019</a:t>
+              <a:t>15/07/2019</a:t>
             </a:fld>
             <a:endParaRPr lang="it-IT"/>
           </a:p>
@@ -2515,7 +2515,7 @@
           <a:p>
             <a:fld id="{BC4DB8D6-4652-4C93-A02F-E71A49F8F853}" type="datetimeFigureOut">
               <a:rPr lang="it-IT" smtClean="0"/>
-              <a:t>29/05/2019</a:t>
+              <a:t>15/07/2019</a:t>
             </a:fld>
             <a:endParaRPr lang="it-IT"/>
           </a:p>
@@ -2728,7 +2728,7 @@
           <a:p>
             <a:fld id="{BC4DB8D6-4652-4C93-A02F-E71A49F8F853}" type="datetimeFigureOut">
               <a:rPr lang="it-IT" smtClean="0"/>
-              <a:t>29/05/2019</a:t>
+              <a:t>15/07/2019</a:t>
             </a:fld>
             <a:endParaRPr lang="it-IT"/>
           </a:p>
@@ -20336,11 +20336,7 @@
           <a:p>
             <a:r>
               <a:rPr lang="it-IT" dirty="0" smtClean="0"/>
-              <a:t>Part </a:t>
-            </a:r>
-            <a:r>
-              <a:rPr lang="it-IT" dirty="0" smtClean="0"/>
-              <a:t>3</a:t>
+              <a:t>Part 3</a:t>
             </a:r>
             <a:endParaRPr lang="it-IT" dirty="0"/>
           </a:p>
@@ -20484,7 +20480,6 @@
                   <a:rPr lang="it-IT" sz="2400" dirty="0"/>
                   <a:t>Y1</a:t>
                 </a:r>
-                <a:endParaRPr lang="it-IT" sz="2400" dirty="0"/>
               </a:p>
             </p:txBody>
           </p:sp>
@@ -20590,8 +20585,8 @@
                 </p:txBody>
               </p:sp>
             </p:grpSp>
-            <mc:AlternateContent xmlns:mc="http://schemas.openxmlformats.org/markup-compatibility/2006">
-              <mc:Choice xmlns:a14="http://schemas.microsoft.com/office/drawing/2010/main" Requires="a14">
+            <mc:AlternateContent xmlns:mc="http://schemas.openxmlformats.org/markup-compatibility/2006" xmlns:a14="http://schemas.microsoft.com/office/drawing/2010/main">
+              <mc:Choice Requires="a14">
                 <p:sp>
                   <p:nvSpPr>
                     <p:cNvPr id="11" name="CasellaDiTesto 10"/>
@@ -20654,7 +20649,7 @@
                   </p:txBody>
                 </p:sp>
               </mc:Choice>
-              <mc:Fallback>
+              <mc:Fallback xmlns="">
                 <p:sp>
                   <p:nvSpPr>
                     <p:cNvPr id="11" name="CasellaDiTesto 10"/>
@@ -20852,8 +20847,8 @@
                 </p:txBody>
               </p:sp>
             </p:grpSp>
-            <mc:AlternateContent xmlns:mc="http://schemas.openxmlformats.org/markup-compatibility/2006">
-              <mc:Choice xmlns:a14="http://schemas.microsoft.com/office/drawing/2010/main" Requires="a14">
+            <mc:AlternateContent xmlns:mc="http://schemas.openxmlformats.org/markup-compatibility/2006" xmlns:a14="http://schemas.microsoft.com/office/drawing/2010/main">
+              <mc:Choice Requires="a14">
                 <p:sp>
                   <p:nvSpPr>
                     <p:cNvPr id="47" name="CasellaDiTesto 46"/>
@@ -20916,7 +20911,7 @@
                   </p:txBody>
                 </p:sp>
               </mc:Choice>
-              <mc:Fallback>
+              <mc:Fallback xmlns="">
                 <p:sp>
                   <p:nvSpPr>
                     <p:cNvPr id="47" name="CasellaDiTesto 46"/>
@@ -21114,8 +21109,8 @@
                 </p:txBody>
               </p:sp>
             </p:grpSp>
-            <mc:AlternateContent xmlns:mc="http://schemas.openxmlformats.org/markup-compatibility/2006">
-              <mc:Choice xmlns:a14="http://schemas.microsoft.com/office/drawing/2010/main" Requires="a14">
+            <mc:AlternateContent xmlns:mc="http://schemas.openxmlformats.org/markup-compatibility/2006" xmlns:a14="http://schemas.microsoft.com/office/drawing/2010/main">
+              <mc:Choice Requires="a14">
                 <p:sp>
                   <p:nvSpPr>
                     <p:cNvPr id="54" name="CasellaDiTesto 53"/>
@@ -21178,7 +21173,7 @@
                   </p:txBody>
                 </p:sp>
               </mc:Choice>
-              <mc:Fallback>
+              <mc:Fallback xmlns="">
                 <p:sp>
                   <p:nvSpPr>
                     <p:cNvPr id="54" name="CasellaDiTesto 53"/>
@@ -21261,8 +21256,8 @@
         </p:nvSpPr>
         <p:spPr>
           <a:xfrm>
-            <a:off x="503548" y="260121"/>
-            <a:ext cx="1080120" cy="938427"/>
+            <a:off x="589967" y="332656"/>
+            <a:ext cx="957697" cy="865892"/>
           </a:xfrm>
           <a:prstGeom prst="ellipse">
             <a:avLst/>
@@ -21363,11 +21358,7 @@
           <a:p>
             <a:r>
               <a:rPr lang="it-IT" dirty="0" smtClean="0"/>
-              <a:t>Y0</a:t>
-            </a:r>
-            <a:r>
-              <a:rPr lang="it-IT" dirty="0" smtClean="0"/>
-              <a:t> </a:t>
+              <a:t>Y0 </a:t>
             </a:r>
             <a:r>
               <a:rPr lang="it-IT" dirty="0" err="1" smtClean="0"/>
@@ -21419,8 +21410,8 @@
           </a:p>
         </p:txBody>
       </p:sp>
-      <mc:AlternateContent xmlns:mc="http://schemas.openxmlformats.org/markup-compatibility/2006">
-        <mc:Choice xmlns:a14="http://schemas.microsoft.com/office/drawing/2010/main" Requires="a14">
+      <mc:AlternateContent xmlns:mc="http://schemas.openxmlformats.org/markup-compatibility/2006" xmlns:a14="http://schemas.microsoft.com/office/drawing/2010/main">
+        <mc:Choice Requires="a14">
           <p:sp>
             <p:nvSpPr>
               <p:cNvPr id="59" name="CasellaDiTesto 58"/>
@@ -21495,7 +21486,7 @@
             </p:txBody>
           </p:sp>
         </mc:Choice>
-        <mc:Fallback>
+        <mc:Fallback xmlns="">
           <p:sp>
             <p:nvSpPr>
               <p:cNvPr id="59" name="CasellaDiTesto 58"/>
@@ -21534,8 +21525,8 @@
           </p:sp>
         </mc:Fallback>
       </mc:AlternateContent>
-      <mc:AlternateContent xmlns:mc="http://schemas.openxmlformats.org/markup-compatibility/2006">
-        <mc:Choice xmlns:a14="http://schemas.microsoft.com/office/drawing/2010/main" Requires="a14">
+      <mc:AlternateContent xmlns:mc="http://schemas.openxmlformats.org/markup-compatibility/2006" xmlns:a14="http://schemas.microsoft.com/office/drawing/2010/main">
+        <mc:Choice Requires="a14">
           <p:graphicFrame>
             <p:nvGraphicFramePr>
               <p:cNvPr id="60" name="Tabella 59"/>
@@ -21656,6 +21647,7 @@
                         <a:bodyPr/>
                         <a:lstStyle/>
                         <a:p>
+                          <a:pPr/>
                           <a14:m>
                             <m:oMathPara xmlns:m="http://schemas.openxmlformats.org/officeDocument/2006/math">
                               <m:oMathParaPr>
@@ -21881,6 +21873,7 @@
                         <a:bodyPr/>
                         <a:lstStyle/>
                         <a:p>
+                          <a:pPr/>
                           <a14:m>
                             <m:oMathPara xmlns:m="http://schemas.openxmlformats.org/officeDocument/2006/math">
                               <m:oMathParaPr>
@@ -21986,7 +21979,7 @@
             </a:graphic>
           </p:graphicFrame>
         </mc:Choice>
-        <mc:Fallback>
+        <mc:Fallback xmlns="">
           <p:graphicFrame>
             <p:nvGraphicFramePr>
               <p:cNvPr id="60" name="Tabella 59"/>
@@ -22372,8 +22365,8 @@
           </p:graphicFrame>
         </mc:Fallback>
       </mc:AlternateContent>
-      <mc:AlternateContent xmlns:mc="http://schemas.openxmlformats.org/markup-compatibility/2006">
-        <mc:Choice xmlns:a14="http://schemas.microsoft.com/office/drawing/2010/main" Requires="a14">
+      <mc:AlternateContent xmlns:mc="http://schemas.openxmlformats.org/markup-compatibility/2006" xmlns:a14="http://schemas.microsoft.com/office/drawing/2010/main">
+        <mc:Choice Requires="a14">
           <p:sp>
             <p:nvSpPr>
               <p:cNvPr id="61" name="CasellaDiTesto 60"/>
@@ -22503,7 +22496,7 @@
             </p:txBody>
           </p:sp>
         </mc:Choice>
-        <mc:Fallback>
+        <mc:Fallback xmlns="">
           <p:sp>
             <p:nvSpPr>
               <p:cNvPr id="61" name="CasellaDiTesto 60"/>

</xml_diff>